<commit_message>
Modified ConOPs pptx & png
</commit_message>
<xml_diff>
--- a/description/Weather_Grabber.pptx
+++ b/description/Weather_Grabber.pptx
@@ -259,7 +259,7 @@
           <a:p>
             <a:fld id="{5890C646-34A1-4525-B97B-29EE678049D1}" type="datetimeFigureOut">
               <a:rPr lang="en-US" smtClean="0"/>
-              <a:t>6/17/2021</a:t>
+              <a:t>6/19/2021</a:t>
             </a:fld>
             <a:endParaRPr lang="en-US"/>
           </a:p>
@@ -457,7 +457,7 @@
           <a:p>
             <a:fld id="{5890C646-34A1-4525-B97B-29EE678049D1}" type="datetimeFigureOut">
               <a:rPr lang="en-US" smtClean="0"/>
-              <a:t>6/17/2021</a:t>
+              <a:t>6/19/2021</a:t>
             </a:fld>
             <a:endParaRPr lang="en-US"/>
           </a:p>
@@ -665,7 +665,7 @@
           <a:p>
             <a:fld id="{5890C646-34A1-4525-B97B-29EE678049D1}" type="datetimeFigureOut">
               <a:rPr lang="en-US" smtClean="0"/>
-              <a:t>6/17/2021</a:t>
+              <a:t>6/19/2021</a:t>
             </a:fld>
             <a:endParaRPr lang="en-US"/>
           </a:p>
@@ -863,7 +863,7 @@
           <a:p>
             <a:fld id="{5890C646-34A1-4525-B97B-29EE678049D1}" type="datetimeFigureOut">
               <a:rPr lang="en-US" smtClean="0"/>
-              <a:t>6/17/2021</a:t>
+              <a:t>6/19/2021</a:t>
             </a:fld>
             <a:endParaRPr lang="en-US"/>
           </a:p>
@@ -1138,7 +1138,7 @@
           <a:p>
             <a:fld id="{5890C646-34A1-4525-B97B-29EE678049D1}" type="datetimeFigureOut">
               <a:rPr lang="en-US" smtClean="0"/>
-              <a:t>6/17/2021</a:t>
+              <a:t>6/19/2021</a:t>
             </a:fld>
             <a:endParaRPr lang="en-US"/>
           </a:p>
@@ -1403,7 +1403,7 @@
           <a:p>
             <a:fld id="{5890C646-34A1-4525-B97B-29EE678049D1}" type="datetimeFigureOut">
               <a:rPr lang="en-US" smtClean="0"/>
-              <a:t>6/17/2021</a:t>
+              <a:t>6/19/2021</a:t>
             </a:fld>
             <a:endParaRPr lang="en-US"/>
           </a:p>
@@ -1815,7 +1815,7 @@
           <a:p>
             <a:fld id="{5890C646-34A1-4525-B97B-29EE678049D1}" type="datetimeFigureOut">
               <a:rPr lang="en-US" smtClean="0"/>
-              <a:t>6/17/2021</a:t>
+              <a:t>6/19/2021</a:t>
             </a:fld>
             <a:endParaRPr lang="en-US"/>
           </a:p>
@@ -1956,7 +1956,7 @@
           <a:p>
             <a:fld id="{5890C646-34A1-4525-B97B-29EE678049D1}" type="datetimeFigureOut">
               <a:rPr lang="en-US" smtClean="0"/>
-              <a:t>6/17/2021</a:t>
+              <a:t>6/19/2021</a:t>
             </a:fld>
             <a:endParaRPr lang="en-US"/>
           </a:p>
@@ -2069,7 +2069,7 @@
           <a:p>
             <a:fld id="{5890C646-34A1-4525-B97B-29EE678049D1}" type="datetimeFigureOut">
               <a:rPr lang="en-US" smtClean="0"/>
-              <a:t>6/17/2021</a:t>
+              <a:t>6/19/2021</a:t>
             </a:fld>
             <a:endParaRPr lang="en-US"/>
           </a:p>
@@ -2380,7 +2380,7 @@
           <a:p>
             <a:fld id="{5890C646-34A1-4525-B97B-29EE678049D1}" type="datetimeFigureOut">
               <a:rPr lang="en-US" smtClean="0"/>
-              <a:t>6/17/2021</a:t>
+              <a:t>6/19/2021</a:t>
             </a:fld>
             <a:endParaRPr lang="en-US"/>
           </a:p>
@@ -2668,7 +2668,7 @@
           <a:p>
             <a:fld id="{5890C646-34A1-4525-B97B-29EE678049D1}" type="datetimeFigureOut">
               <a:rPr lang="en-US" smtClean="0"/>
-              <a:t>6/17/2021</a:t>
+              <a:t>6/19/2021</a:t>
             </a:fld>
             <a:endParaRPr lang="en-US"/>
           </a:p>
@@ -2909,7 +2909,7 @@
           <a:p>
             <a:fld id="{5890C646-34A1-4525-B97B-29EE678049D1}" type="datetimeFigureOut">
               <a:rPr lang="en-US" smtClean="0"/>
-              <a:t>6/17/2021</a:t>
+              <a:t>6/19/2021</a:t>
             </a:fld>
             <a:endParaRPr lang="en-US"/>
           </a:p>
@@ -3373,1167 +3373,1534 @@
           </a:p>
         </p:txBody>
       </p:sp>
-      <p:grpSp>
-        <p:nvGrpSpPr>
-          <p:cNvPr id="23" name="Group 22">
-            <a:extLst>
-              <a:ext uri="{FF2B5EF4-FFF2-40B4-BE49-F238E27FC236}">
-                <a16:creationId xmlns:a16="http://schemas.microsoft.com/office/drawing/2014/main" id="{04C8548B-37D0-4A07-90E9-6BC5BEC427F8}"/>
-              </a:ext>
-            </a:extLst>
-          </p:cNvPr>
-          <p:cNvGrpSpPr/>
+      <p:sp>
+        <p:nvSpPr>
+          <p:cNvPr id="4" name="Rectangle 3">
+            <a:extLst>
+              <a:ext uri="{FF2B5EF4-FFF2-40B4-BE49-F238E27FC236}">
+                <a16:creationId xmlns:a16="http://schemas.microsoft.com/office/drawing/2014/main" id="{C2D05949-619B-4C72-8589-0228AC0287D8}"/>
+              </a:ext>
+            </a:extLst>
+          </p:cNvPr>
+          <p:cNvSpPr/>
           <p:nvPr/>
-        </p:nvGrpSpPr>
-        <p:grpSpPr>
-          <a:xfrm>
-            <a:off x="2040381" y="1546028"/>
-            <a:ext cx="8111238" cy="5033697"/>
-            <a:chOff x="2010700" y="1546028"/>
-            <a:chExt cx="8111238" cy="5033697"/>
-          </a:xfrm>
-        </p:grpSpPr>
-        <p:sp>
-          <p:nvSpPr>
-            <p:cNvPr id="4" name="Rectangle 3">
-              <a:extLst>
-                <a:ext uri="{FF2B5EF4-FFF2-40B4-BE49-F238E27FC236}">
-                  <a16:creationId xmlns:a16="http://schemas.microsoft.com/office/drawing/2014/main" id="{C2D05949-619B-4C72-8589-0228AC0287D8}"/>
-                </a:ext>
-              </a:extLst>
-            </p:cNvPr>
-            <p:cNvSpPr/>
-            <p:nvPr/>
-          </p:nvSpPr>
-          <p:spPr>
-            <a:xfrm>
-              <a:off x="8452421" y="4077929"/>
-              <a:ext cx="1669517" cy="896702"/>
-            </a:xfrm>
-            <a:prstGeom prst="rect">
-              <a:avLst/>
-            </a:prstGeom>
-          </p:spPr>
-          <p:style>
-            <a:lnRef idx="2">
-              <a:schemeClr val="accent1">
-                <a:shade val="50000"/>
-              </a:schemeClr>
-            </a:lnRef>
-            <a:fillRef idx="1">
-              <a:schemeClr val="accent1"/>
-            </a:fillRef>
-            <a:effectRef idx="0">
-              <a:schemeClr val="accent1"/>
-            </a:effectRef>
-            <a:fontRef idx="minor">
-              <a:schemeClr val="lt1"/>
-            </a:fontRef>
-          </p:style>
-          <p:txBody>
-            <a:bodyPr rtlCol="0" anchor="ctr"/>
-            <a:lstStyle/>
-            <a:p>
-              <a:pPr algn="ctr"/>
-              <a:r>
-                <a:rPr lang="en-US" dirty="0"/>
-                <a:t>Server Generates </a:t>
-              </a:r>
-              <a:r>
-                <a:rPr lang="en-US" b="1" dirty="0">
-                  <a:solidFill>
-                    <a:srgbClr val="FFFF00"/>
-                  </a:solidFill>
-                </a:rPr>
-                <a:t>iCalendar File</a:t>
-              </a:r>
-            </a:p>
-          </p:txBody>
-        </p:sp>
-        <p:sp>
-          <p:nvSpPr>
-            <p:cNvPr id="6" name="Rectangle 5">
-              <a:extLst>
-                <a:ext uri="{FF2B5EF4-FFF2-40B4-BE49-F238E27FC236}">
-                  <a16:creationId xmlns:a16="http://schemas.microsoft.com/office/drawing/2014/main" id="{BFF2225A-C7BE-4C40-B635-213D14A57082}"/>
-                </a:ext>
-              </a:extLst>
-            </p:cNvPr>
-            <p:cNvSpPr/>
-            <p:nvPr/>
-          </p:nvSpPr>
-          <p:spPr>
-            <a:xfrm>
-              <a:off x="2010700" y="4069625"/>
-              <a:ext cx="1669517" cy="896702"/>
-            </a:xfrm>
-            <a:prstGeom prst="rect">
-              <a:avLst/>
-            </a:prstGeom>
-          </p:spPr>
-          <p:style>
-            <a:lnRef idx="2">
-              <a:schemeClr val="accent1">
-                <a:shade val="50000"/>
-              </a:schemeClr>
-            </a:lnRef>
-            <a:fillRef idx="1">
-              <a:schemeClr val="accent1"/>
-            </a:fillRef>
-            <a:effectRef idx="0">
-              <a:schemeClr val="accent1"/>
-            </a:effectRef>
-            <a:fontRef idx="minor">
-              <a:schemeClr val="lt1"/>
-            </a:fontRef>
-          </p:style>
-          <p:txBody>
-            <a:bodyPr rtlCol="0" anchor="ctr"/>
-            <a:lstStyle/>
-            <a:p>
-              <a:pPr algn="ctr"/>
-              <a:r>
-                <a:rPr lang="en-US" dirty="0"/>
-                <a:t>Zip Code API</a:t>
-              </a:r>
-            </a:p>
-            <a:p>
-              <a:pPr algn="ctr"/>
-              <a:r>
-                <a:rPr lang="en-US" b="1" dirty="0">
-                  <a:solidFill>
-                    <a:srgbClr val="FFFF00"/>
-                  </a:solidFill>
-                </a:rPr>
-                <a:t>Latitude, Longitude</a:t>
-              </a:r>
-            </a:p>
-          </p:txBody>
-        </p:sp>
-        <p:sp>
-          <p:nvSpPr>
-            <p:cNvPr id="9" name="Rectangle 8">
-              <a:extLst>
-                <a:ext uri="{FF2B5EF4-FFF2-40B4-BE49-F238E27FC236}">
-                  <a16:creationId xmlns:a16="http://schemas.microsoft.com/office/drawing/2014/main" id="{112CA398-796B-4A36-9D44-16C68F55F3D4}"/>
-                </a:ext>
-              </a:extLst>
-            </p:cNvPr>
-            <p:cNvSpPr/>
-            <p:nvPr/>
-          </p:nvSpPr>
-          <p:spPr>
-            <a:xfrm>
-              <a:off x="4150194" y="4069625"/>
-              <a:ext cx="1669517" cy="896702"/>
-            </a:xfrm>
-            <a:prstGeom prst="rect">
-              <a:avLst/>
-            </a:prstGeom>
-          </p:spPr>
-          <p:style>
-            <a:lnRef idx="2">
-              <a:schemeClr val="accent1">
-                <a:shade val="50000"/>
-              </a:schemeClr>
-            </a:lnRef>
-            <a:fillRef idx="1">
-              <a:schemeClr val="accent1"/>
-            </a:fillRef>
-            <a:effectRef idx="0">
-              <a:schemeClr val="accent1"/>
-            </a:effectRef>
-            <a:fontRef idx="minor">
-              <a:schemeClr val="lt1"/>
-            </a:fontRef>
-          </p:style>
-          <p:txBody>
-            <a:bodyPr rtlCol="0" anchor="ctr"/>
-            <a:lstStyle/>
-            <a:p>
-              <a:pPr algn="ctr"/>
-              <a:r>
-                <a:rPr lang="en-US" dirty="0"/>
-                <a:t>Weather API</a:t>
-              </a:r>
-            </a:p>
-            <a:p>
-              <a:pPr algn="ctr"/>
-              <a:r>
-                <a:rPr lang="en-US" b="1" dirty="0">
-                  <a:solidFill>
-                    <a:srgbClr val="FFFF00"/>
-                  </a:solidFill>
-                </a:rPr>
-                <a:t>Station, Data</a:t>
-              </a:r>
-            </a:p>
-          </p:txBody>
-        </p:sp>
-        <p:cxnSp>
-          <p:nvCxnSpPr>
-            <p:cNvPr id="11" name="Straight Arrow Connector 10">
-              <a:extLst>
-                <a:ext uri="{FF2B5EF4-FFF2-40B4-BE49-F238E27FC236}">
-                  <a16:creationId xmlns:a16="http://schemas.microsoft.com/office/drawing/2014/main" id="{A42A331A-7A1F-4E93-9E9B-B8B6D541D02A}"/>
-                </a:ext>
-              </a:extLst>
-            </p:cNvPr>
-            <p:cNvCxnSpPr>
-              <a:cxnSpLocks/>
-              <a:endCxn id="13" idx="1"/>
-            </p:cNvCxnSpPr>
-            <p:nvPr/>
-          </p:nvCxnSpPr>
-          <p:spPr>
-            <a:xfrm>
-              <a:off x="5819711" y="4517976"/>
-              <a:ext cx="469978" cy="0"/>
-            </a:xfrm>
-            <a:prstGeom prst="straightConnector1">
-              <a:avLst/>
-            </a:prstGeom>
-            <a:ln w="19050">
-              <a:solidFill>
-                <a:schemeClr val="bg1"/>
-              </a:solidFill>
-              <a:tailEnd type="triangle"/>
-            </a:ln>
-          </p:spPr>
-          <p:style>
-            <a:lnRef idx="1">
-              <a:schemeClr val="accent1"/>
-            </a:lnRef>
-            <a:fillRef idx="0">
-              <a:schemeClr val="accent1"/>
-            </a:fillRef>
-            <a:effectRef idx="0">
-              <a:schemeClr val="accent1"/>
-            </a:effectRef>
-            <a:fontRef idx="minor">
-              <a:schemeClr val="tx1"/>
-            </a:fontRef>
-          </p:style>
-        </p:cxnSp>
-        <p:sp>
-          <p:nvSpPr>
-            <p:cNvPr id="13" name="Rectangle 12">
-              <a:extLst>
-                <a:ext uri="{FF2B5EF4-FFF2-40B4-BE49-F238E27FC236}">
-                  <a16:creationId xmlns:a16="http://schemas.microsoft.com/office/drawing/2014/main" id="{68130133-2AE8-4B8B-B13A-EECB0FA92935}"/>
-                </a:ext>
-              </a:extLst>
-            </p:cNvPr>
-            <p:cNvSpPr/>
-            <p:nvPr/>
-          </p:nvSpPr>
-          <p:spPr>
-            <a:xfrm>
-              <a:off x="6289689" y="4069625"/>
-              <a:ext cx="1669517" cy="896702"/>
-            </a:xfrm>
-            <a:prstGeom prst="rect">
-              <a:avLst/>
-            </a:prstGeom>
-          </p:spPr>
-          <p:style>
-            <a:lnRef idx="2">
-              <a:schemeClr val="accent1">
-                <a:shade val="50000"/>
-              </a:schemeClr>
-            </a:lnRef>
-            <a:fillRef idx="1">
-              <a:schemeClr val="accent1"/>
-            </a:fillRef>
-            <a:effectRef idx="0">
-              <a:schemeClr val="accent1"/>
-            </a:effectRef>
-            <a:fontRef idx="minor">
-              <a:schemeClr val="lt1"/>
-            </a:fontRef>
-          </p:style>
-          <p:txBody>
-            <a:bodyPr rtlCol="0" anchor="ctr"/>
-            <a:lstStyle/>
-            <a:p>
-              <a:pPr algn="ctr"/>
-              <a:r>
-                <a:rPr lang="en-US" dirty="0"/>
-                <a:t>App Displays</a:t>
-              </a:r>
-            </a:p>
-            <a:p>
-              <a:pPr algn="ctr"/>
-              <a:r>
-                <a:rPr lang="en-US" b="1" dirty="0">
-                  <a:solidFill>
-                    <a:srgbClr val="FFFF00"/>
-                  </a:solidFill>
-                </a:rPr>
-                <a:t>Formatted Report</a:t>
-              </a:r>
-            </a:p>
-          </p:txBody>
-        </p:sp>
-        <p:cxnSp>
-          <p:nvCxnSpPr>
-            <p:cNvPr id="22" name="Straight Arrow Connector 21">
-              <a:extLst>
-                <a:ext uri="{FF2B5EF4-FFF2-40B4-BE49-F238E27FC236}">
-                  <a16:creationId xmlns:a16="http://schemas.microsoft.com/office/drawing/2014/main" id="{3072DE0D-CEBE-40DD-B064-72FACE193D19}"/>
-                </a:ext>
-              </a:extLst>
-            </p:cNvPr>
-            <p:cNvCxnSpPr>
-              <a:cxnSpLocks/>
-            </p:cNvCxnSpPr>
-            <p:nvPr/>
-          </p:nvCxnSpPr>
-          <p:spPr>
-            <a:xfrm>
-              <a:off x="6470603" y="5355685"/>
-              <a:ext cx="329378" cy="0"/>
-            </a:xfrm>
-            <a:prstGeom prst="straightConnector1">
-              <a:avLst/>
-            </a:prstGeom>
-            <a:ln w="19050">
-              <a:solidFill>
-                <a:schemeClr val="bg1"/>
-              </a:solidFill>
-              <a:tailEnd type="triangle"/>
-            </a:ln>
-          </p:spPr>
-          <p:style>
-            <a:lnRef idx="1">
-              <a:schemeClr val="accent1"/>
-            </a:lnRef>
-            <a:fillRef idx="0">
-              <a:schemeClr val="accent1"/>
-            </a:fillRef>
-            <a:effectRef idx="0">
-              <a:schemeClr val="accent1"/>
-            </a:effectRef>
-            <a:fontRef idx="minor">
-              <a:schemeClr val="tx1"/>
-            </a:fontRef>
-          </p:style>
-        </p:cxnSp>
-        <p:cxnSp>
-          <p:nvCxnSpPr>
-            <p:cNvPr id="25" name="Straight Connector 24">
-              <a:extLst>
-                <a:ext uri="{FF2B5EF4-FFF2-40B4-BE49-F238E27FC236}">
-                  <a16:creationId xmlns:a16="http://schemas.microsoft.com/office/drawing/2014/main" id="{205FED8B-250D-4025-AFB8-F828545D1D18}"/>
-                </a:ext>
-              </a:extLst>
-            </p:cNvPr>
-            <p:cNvCxnSpPr>
-              <a:cxnSpLocks/>
-            </p:cNvCxnSpPr>
-            <p:nvPr/>
-          </p:nvCxnSpPr>
-          <p:spPr>
-            <a:xfrm>
-              <a:off x="6470603" y="4966326"/>
-              <a:ext cx="0" cy="1435608"/>
-            </a:xfrm>
-            <a:prstGeom prst="line">
-              <a:avLst/>
-            </a:prstGeom>
-            <a:ln w="19050">
-              <a:solidFill>
-                <a:schemeClr val="bg1"/>
-              </a:solidFill>
-            </a:ln>
-          </p:spPr>
-          <p:style>
-            <a:lnRef idx="1">
-              <a:schemeClr val="accent1"/>
-            </a:lnRef>
-            <a:fillRef idx="0">
-              <a:schemeClr val="accent1"/>
-            </a:fillRef>
-            <a:effectRef idx="0">
-              <a:schemeClr val="accent1"/>
-            </a:effectRef>
-            <a:fontRef idx="minor">
-              <a:schemeClr val="tx1"/>
-            </a:fontRef>
-          </p:style>
-        </p:cxnSp>
-        <p:cxnSp>
-          <p:nvCxnSpPr>
-            <p:cNvPr id="26" name="Straight Arrow Connector 25">
-              <a:extLst>
-                <a:ext uri="{FF2B5EF4-FFF2-40B4-BE49-F238E27FC236}">
-                  <a16:creationId xmlns:a16="http://schemas.microsoft.com/office/drawing/2014/main" id="{5191192C-B86A-4B96-9FD1-3E45D30476E8}"/>
-                </a:ext>
-              </a:extLst>
-            </p:cNvPr>
-            <p:cNvCxnSpPr>
-              <a:cxnSpLocks/>
-            </p:cNvCxnSpPr>
-            <p:nvPr/>
-          </p:nvCxnSpPr>
-          <p:spPr>
-            <a:xfrm>
-              <a:off x="6470603" y="5632955"/>
-              <a:ext cx="329378" cy="0"/>
-            </a:xfrm>
-            <a:prstGeom prst="straightConnector1">
-              <a:avLst/>
-            </a:prstGeom>
-            <a:ln w="19050">
-              <a:solidFill>
-                <a:schemeClr val="bg1"/>
-              </a:solidFill>
-              <a:tailEnd type="triangle"/>
-            </a:ln>
-          </p:spPr>
-          <p:style>
-            <a:lnRef idx="1">
-              <a:schemeClr val="accent1"/>
-            </a:lnRef>
-            <a:fillRef idx="0">
-              <a:schemeClr val="accent1"/>
-            </a:fillRef>
-            <a:effectRef idx="0">
-              <a:schemeClr val="accent1"/>
-            </a:effectRef>
-            <a:fontRef idx="minor">
-              <a:schemeClr val="tx1"/>
-            </a:fontRef>
-          </p:style>
-        </p:cxnSp>
-        <p:cxnSp>
-          <p:nvCxnSpPr>
-            <p:cNvPr id="27" name="Straight Arrow Connector 26">
-              <a:extLst>
-                <a:ext uri="{FF2B5EF4-FFF2-40B4-BE49-F238E27FC236}">
-                  <a16:creationId xmlns:a16="http://schemas.microsoft.com/office/drawing/2014/main" id="{E152CC7A-E1C0-435A-BC0E-7C6A00D9653F}"/>
-                </a:ext>
-              </a:extLst>
-            </p:cNvPr>
-            <p:cNvCxnSpPr>
-              <a:cxnSpLocks/>
-            </p:cNvCxnSpPr>
-            <p:nvPr/>
-          </p:nvCxnSpPr>
-          <p:spPr>
-            <a:xfrm>
-              <a:off x="6470603" y="5886628"/>
-              <a:ext cx="329378" cy="0"/>
-            </a:xfrm>
-            <a:prstGeom prst="straightConnector1">
-              <a:avLst/>
-            </a:prstGeom>
-            <a:ln w="19050">
-              <a:solidFill>
-                <a:schemeClr val="bg1"/>
-              </a:solidFill>
-              <a:tailEnd type="triangle"/>
-            </a:ln>
-          </p:spPr>
-          <p:style>
-            <a:lnRef idx="1">
-              <a:schemeClr val="accent1"/>
-            </a:lnRef>
-            <a:fillRef idx="0">
-              <a:schemeClr val="accent1"/>
-            </a:fillRef>
-            <a:effectRef idx="0">
-              <a:schemeClr val="accent1"/>
-            </a:effectRef>
-            <a:fontRef idx="minor">
-              <a:schemeClr val="tx1"/>
-            </a:fontRef>
-          </p:style>
-        </p:cxnSp>
-        <p:cxnSp>
-          <p:nvCxnSpPr>
-            <p:cNvPr id="28" name="Straight Arrow Connector 27">
-              <a:extLst>
-                <a:ext uri="{FF2B5EF4-FFF2-40B4-BE49-F238E27FC236}">
-                  <a16:creationId xmlns:a16="http://schemas.microsoft.com/office/drawing/2014/main" id="{09252162-A5D1-4367-9C42-E7ADD9C571A4}"/>
-                </a:ext>
-              </a:extLst>
-            </p:cNvPr>
-            <p:cNvCxnSpPr>
-              <a:cxnSpLocks/>
-            </p:cNvCxnSpPr>
-            <p:nvPr/>
-          </p:nvCxnSpPr>
-          <p:spPr>
-            <a:xfrm>
-              <a:off x="6470603" y="6134400"/>
-              <a:ext cx="329378" cy="0"/>
-            </a:xfrm>
-            <a:prstGeom prst="straightConnector1">
-              <a:avLst/>
-            </a:prstGeom>
-            <a:ln w="19050">
-              <a:solidFill>
-                <a:schemeClr val="bg1"/>
-              </a:solidFill>
-              <a:tailEnd type="triangle"/>
-            </a:ln>
-          </p:spPr>
-          <p:style>
-            <a:lnRef idx="1">
-              <a:schemeClr val="accent1"/>
-            </a:lnRef>
-            <a:fillRef idx="0">
-              <a:schemeClr val="accent1"/>
-            </a:fillRef>
-            <a:effectRef idx="0">
-              <a:schemeClr val="accent1"/>
-            </a:effectRef>
-            <a:fontRef idx="minor">
-              <a:schemeClr val="tx1"/>
-            </a:fontRef>
-          </p:style>
-        </p:cxnSp>
-        <p:sp>
-          <p:nvSpPr>
-            <p:cNvPr id="29" name="TextBox 28">
-              <a:extLst>
-                <a:ext uri="{FF2B5EF4-FFF2-40B4-BE49-F238E27FC236}">
-                  <a16:creationId xmlns:a16="http://schemas.microsoft.com/office/drawing/2014/main" id="{3D0C7F44-A5E1-4F68-BEDF-06C338A75DF1}"/>
-                </a:ext>
-              </a:extLst>
-            </p:cNvPr>
-            <p:cNvSpPr txBox="1"/>
-            <p:nvPr/>
-          </p:nvSpPr>
-          <p:spPr>
-            <a:xfrm>
-              <a:off x="6799981" y="5183671"/>
-              <a:ext cx="1388585" cy="369332"/>
-            </a:xfrm>
-            <a:prstGeom prst="rect">
-              <a:avLst/>
-            </a:prstGeom>
-            <a:noFill/>
-          </p:spPr>
-          <p:txBody>
-            <a:bodyPr wrap="none" rtlCol="0">
-              <a:spAutoFit/>
-            </a:bodyPr>
-            <a:lstStyle/>
-            <a:p>
-              <a:r>
-                <a:rPr lang="en-US" dirty="0">
-                  <a:solidFill>
-                    <a:schemeClr val="bg1"/>
-                  </a:solidFill>
-                </a:rPr>
-                <a:t>Temperature</a:t>
-              </a:r>
-            </a:p>
-          </p:txBody>
-        </p:sp>
-        <p:sp>
-          <p:nvSpPr>
-            <p:cNvPr id="30" name="TextBox 29">
-              <a:extLst>
-                <a:ext uri="{FF2B5EF4-FFF2-40B4-BE49-F238E27FC236}">
-                  <a16:creationId xmlns:a16="http://schemas.microsoft.com/office/drawing/2014/main" id="{AA753716-696E-46B2-8648-EC626420E2B7}"/>
-                </a:ext>
-              </a:extLst>
-            </p:cNvPr>
-            <p:cNvSpPr txBox="1"/>
-            <p:nvPr/>
-          </p:nvSpPr>
-          <p:spPr>
-            <a:xfrm>
-              <a:off x="6799981" y="5449142"/>
-              <a:ext cx="1043876" cy="369332"/>
-            </a:xfrm>
-            <a:prstGeom prst="rect">
-              <a:avLst/>
-            </a:prstGeom>
-            <a:noFill/>
-          </p:spPr>
-          <p:txBody>
-            <a:bodyPr wrap="none" rtlCol="0">
-              <a:spAutoFit/>
-            </a:bodyPr>
-            <a:lstStyle/>
-            <a:p>
-              <a:r>
-                <a:rPr lang="en-US" dirty="0">
-                  <a:solidFill>
-                    <a:schemeClr val="bg1"/>
-                  </a:solidFill>
-                </a:rPr>
-                <a:t>Humidity</a:t>
-              </a:r>
-            </a:p>
-          </p:txBody>
-        </p:sp>
-        <p:sp>
-          <p:nvSpPr>
-            <p:cNvPr id="31" name="TextBox 30">
-              <a:extLst>
-                <a:ext uri="{FF2B5EF4-FFF2-40B4-BE49-F238E27FC236}">
-                  <a16:creationId xmlns:a16="http://schemas.microsoft.com/office/drawing/2014/main" id="{97AE06FE-E0FC-4C2A-9A69-06586458E310}"/>
-                </a:ext>
-              </a:extLst>
-            </p:cNvPr>
-            <p:cNvSpPr txBox="1"/>
-            <p:nvPr/>
-          </p:nvSpPr>
-          <p:spPr>
-            <a:xfrm>
-              <a:off x="6799981" y="5706696"/>
-              <a:ext cx="1613327" cy="369332"/>
-            </a:xfrm>
-            <a:prstGeom prst="rect">
-              <a:avLst/>
-            </a:prstGeom>
-            <a:noFill/>
-          </p:spPr>
-          <p:txBody>
-            <a:bodyPr wrap="none" rtlCol="0">
-              <a:spAutoFit/>
-            </a:bodyPr>
-            <a:lstStyle/>
-            <a:p>
-              <a:r>
-                <a:rPr lang="en-US" dirty="0">
-                  <a:solidFill>
-                    <a:schemeClr val="bg1"/>
-                  </a:solidFill>
-                </a:rPr>
-                <a:t>Sunrise, Sunset</a:t>
-              </a:r>
-            </a:p>
-          </p:txBody>
-        </p:sp>
-        <p:sp>
-          <p:nvSpPr>
-            <p:cNvPr id="32" name="TextBox 31">
-              <a:extLst>
-                <a:ext uri="{FF2B5EF4-FFF2-40B4-BE49-F238E27FC236}">
-                  <a16:creationId xmlns:a16="http://schemas.microsoft.com/office/drawing/2014/main" id="{93295AC2-A50F-4FB6-87AB-9C412A7AB012}"/>
-                </a:ext>
-              </a:extLst>
-            </p:cNvPr>
-            <p:cNvSpPr txBox="1"/>
-            <p:nvPr/>
-          </p:nvSpPr>
-          <p:spPr>
-            <a:xfrm>
-              <a:off x="6799981" y="5954783"/>
-              <a:ext cx="2289601" cy="369332"/>
-            </a:xfrm>
-            <a:prstGeom prst="rect">
-              <a:avLst/>
-            </a:prstGeom>
-            <a:noFill/>
-          </p:spPr>
-          <p:txBody>
-            <a:bodyPr wrap="none" rtlCol="0">
-              <a:spAutoFit/>
-            </a:bodyPr>
-            <a:lstStyle/>
-            <a:p>
-              <a:r>
-                <a:rPr lang="en-US" dirty="0">
-                  <a:solidFill>
-                    <a:schemeClr val="bg1"/>
-                  </a:solidFill>
-                </a:rPr>
-                <a:t>Wind Speed, Direction</a:t>
-              </a:r>
-            </a:p>
-          </p:txBody>
-        </p:sp>
-        <p:sp>
-          <p:nvSpPr>
-            <p:cNvPr id="35" name="Rectangle 34">
-              <a:extLst>
-                <a:ext uri="{FF2B5EF4-FFF2-40B4-BE49-F238E27FC236}">
-                  <a16:creationId xmlns:a16="http://schemas.microsoft.com/office/drawing/2014/main" id="{082ACA58-644F-461B-B9BF-40964C008351}"/>
-                </a:ext>
-              </a:extLst>
-            </p:cNvPr>
-            <p:cNvSpPr/>
-            <p:nvPr/>
-          </p:nvSpPr>
-          <p:spPr>
-            <a:xfrm>
-              <a:off x="2010700" y="1546028"/>
-              <a:ext cx="1669517" cy="896702"/>
-            </a:xfrm>
-            <a:prstGeom prst="rect">
-              <a:avLst/>
-            </a:prstGeom>
-          </p:spPr>
-          <p:style>
-            <a:lnRef idx="2">
-              <a:schemeClr val="accent6">
-                <a:shade val="50000"/>
-              </a:schemeClr>
-            </a:lnRef>
-            <a:fillRef idx="1">
-              <a:schemeClr val="accent6"/>
-            </a:fillRef>
-            <a:effectRef idx="0">
-              <a:schemeClr val="accent6"/>
-            </a:effectRef>
-            <a:fontRef idx="minor">
-              <a:schemeClr val="lt1"/>
-            </a:fontRef>
-          </p:style>
-          <p:txBody>
-            <a:bodyPr rtlCol="0" anchor="ctr"/>
-            <a:lstStyle/>
-            <a:p>
-              <a:pPr algn="ctr"/>
-              <a:r>
-                <a:rPr lang="en-US" dirty="0"/>
-                <a:t>User Input </a:t>
-              </a:r>
-            </a:p>
-            <a:p>
-              <a:pPr algn="ctr"/>
-              <a:r>
-                <a:rPr lang="en-US" b="1" dirty="0">
-                  <a:solidFill>
-                    <a:srgbClr val="FFFF00"/>
-                  </a:solidFill>
-                </a:rPr>
-                <a:t>Zip Code</a:t>
-              </a:r>
-            </a:p>
-          </p:txBody>
-        </p:sp>
-        <p:cxnSp>
-          <p:nvCxnSpPr>
-            <p:cNvPr id="36" name="Straight Arrow Connector 35">
-              <a:extLst>
-                <a:ext uri="{FF2B5EF4-FFF2-40B4-BE49-F238E27FC236}">
-                  <a16:creationId xmlns:a16="http://schemas.microsoft.com/office/drawing/2014/main" id="{316B1166-9533-406C-85F1-AF6664203874}"/>
-                </a:ext>
-              </a:extLst>
-            </p:cNvPr>
-            <p:cNvCxnSpPr>
-              <a:cxnSpLocks/>
-              <a:stCxn id="35" idx="2"/>
-              <a:endCxn id="6" idx="0"/>
-            </p:cNvCxnSpPr>
-            <p:nvPr/>
-          </p:nvCxnSpPr>
-          <p:spPr>
-            <a:xfrm>
-              <a:off x="2845459" y="2442730"/>
-              <a:ext cx="0" cy="1626895"/>
-            </a:xfrm>
-            <a:prstGeom prst="straightConnector1">
-              <a:avLst/>
-            </a:prstGeom>
-            <a:ln w="19050">
-              <a:solidFill>
-                <a:schemeClr val="bg1"/>
-              </a:solidFill>
-              <a:tailEnd type="triangle"/>
-            </a:ln>
-          </p:spPr>
-          <p:style>
-            <a:lnRef idx="1">
-              <a:schemeClr val="accent1"/>
-            </a:lnRef>
-            <a:fillRef idx="0">
-              <a:schemeClr val="accent1"/>
-            </a:fillRef>
-            <a:effectRef idx="0">
-              <a:schemeClr val="accent1"/>
-            </a:effectRef>
-            <a:fontRef idx="minor">
-              <a:schemeClr val="tx1"/>
-            </a:fontRef>
-          </p:style>
-        </p:cxnSp>
-        <p:cxnSp>
-          <p:nvCxnSpPr>
-            <p:cNvPr id="43" name="Straight Arrow Connector 42">
-              <a:extLst>
-                <a:ext uri="{FF2B5EF4-FFF2-40B4-BE49-F238E27FC236}">
-                  <a16:creationId xmlns:a16="http://schemas.microsoft.com/office/drawing/2014/main" id="{C62DD7BC-4499-48E8-BFA0-9873170FF96B}"/>
-                </a:ext>
-              </a:extLst>
-            </p:cNvPr>
-            <p:cNvCxnSpPr>
-              <a:cxnSpLocks/>
-              <a:endCxn id="4" idx="1"/>
-            </p:cNvCxnSpPr>
-            <p:nvPr/>
-          </p:nvCxnSpPr>
-          <p:spPr>
-            <a:xfrm>
-              <a:off x="7959206" y="4526280"/>
-              <a:ext cx="493215" cy="0"/>
-            </a:xfrm>
-            <a:prstGeom prst="straightConnector1">
-              <a:avLst/>
-            </a:prstGeom>
-            <a:ln w="19050">
-              <a:solidFill>
-                <a:schemeClr val="bg1"/>
-              </a:solidFill>
-              <a:tailEnd type="triangle"/>
-            </a:ln>
-          </p:spPr>
-          <p:style>
-            <a:lnRef idx="1">
-              <a:schemeClr val="accent1"/>
-            </a:lnRef>
-            <a:fillRef idx="0">
-              <a:schemeClr val="accent1"/>
-            </a:fillRef>
-            <a:effectRef idx="0">
-              <a:schemeClr val="accent1"/>
-            </a:effectRef>
-            <a:fontRef idx="minor">
-              <a:schemeClr val="tx1"/>
-            </a:fontRef>
-          </p:style>
-        </p:cxnSp>
-        <p:sp>
-          <p:nvSpPr>
-            <p:cNvPr id="45" name="Rectangle 44">
-              <a:extLst>
-                <a:ext uri="{FF2B5EF4-FFF2-40B4-BE49-F238E27FC236}">
-                  <a16:creationId xmlns:a16="http://schemas.microsoft.com/office/drawing/2014/main" id="{CB5C3700-C416-46E3-88A6-3F3DA4B3A869}"/>
-                </a:ext>
-              </a:extLst>
-            </p:cNvPr>
-            <p:cNvSpPr/>
-            <p:nvPr/>
-          </p:nvSpPr>
-          <p:spPr>
-            <a:xfrm>
-              <a:off x="8452421" y="1546028"/>
-              <a:ext cx="1669517" cy="896702"/>
-            </a:xfrm>
-            <a:prstGeom prst="rect">
-              <a:avLst/>
-            </a:prstGeom>
-          </p:spPr>
-          <p:style>
-            <a:lnRef idx="2">
-              <a:schemeClr val="accent6">
-                <a:shade val="50000"/>
-              </a:schemeClr>
-            </a:lnRef>
-            <a:fillRef idx="1">
-              <a:schemeClr val="accent6"/>
-            </a:fillRef>
-            <a:effectRef idx="0">
-              <a:schemeClr val="accent6"/>
-            </a:effectRef>
-            <a:fontRef idx="minor">
-              <a:schemeClr val="lt1"/>
-            </a:fontRef>
-          </p:style>
-          <p:txBody>
-            <a:bodyPr rtlCol="0" anchor="ctr"/>
-            <a:lstStyle/>
-            <a:p>
-              <a:pPr algn="ctr"/>
-              <a:r>
-                <a:rPr lang="en-US" dirty="0"/>
-                <a:t>User Input </a:t>
-              </a:r>
-              <a:r>
-                <a:rPr lang="en-US" b="1" dirty="0">
-                  <a:solidFill>
-                    <a:srgbClr val="FFFF00"/>
-                  </a:solidFill>
-                </a:rPr>
-                <a:t>Name, Email</a:t>
-              </a:r>
-            </a:p>
-          </p:txBody>
-        </p:sp>
-        <p:cxnSp>
-          <p:nvCxnSpPr>
-            <p:cNvPr id="46" name="Straight Arrow Connector 45">
-              <a:extLst>
-                <a:ext uri="{FF2B5EF4-FFF2-40B4-BE49-F238E27FC236}">
-                  <a16:creationId xmlns:a16="http://schemas.microsoft.com/office/drawing/2014/main" id="{80F3D493-A5C5-4528-AC9B-00A843BB2AC9}"/>
-                </a:ext>
-              </a:extLst>
-            </p:cNvPr>
-            <p:cNvCxnSpPr>
-              <a:cxnSpLocks/>
-              <a:endCxn id="4" idx="0"/>
-            </p:cNvCxnSpPr>
-            <p:nvPr/>
-          </p:nvCxnSpPr>
-          <p:spPr>
-            <a:xfrm>
-              <a:off x="9287180" y="2442730"/>
-              <a:ext cx="0" cy="1635199"/>
-            </a:xfrm>
-            <a:prstGeom prst="straightConnector1">
-              <a:avLst/>
-            </a:prstGeom>
-            <a:ln w="19050">
-              <a:solidFill>
-                <a:schemeClr val="bg1"/>
-              </a:solidFill>
-              <a:tailEnd type="triangle"/>
-            </a:ln>
-          </p:spPr>
-          <p:style>
-            <a:lnRef idx="1">
-              <a:schemeClr val="accent1"/>
-            </a:lnRef>
-            <a:fillRef idx="0">
-              <a:schemeClr val="accent1"/>
-            </a:fillRef>
-            <a:effectRef idx="0">
-              <a:schemeClr val="accent1"/>
-            </a:effectRef>
-            <a:fontRef idx="minor">
-              <a:schemeClr val="tx1"/>
-            </a:fontRef>
-          </p:style>
-        </p:cxnSp>
-        <p:cxnSp>
-          <p:nvCxnSpPr>
-            <p:cNvPr id="33" name="Straight Arrow Connector 32">
-              <a:extLst>
-                <a:ext uri="{FF2B5EF4-FFF2-40B4-BE49-F238E27FC236}">
-                  <a16:creationId xmlns:a16="http://schemas.microsoft.com/office/drawing/2014/main" id="{F13018D9-25F0-483C-978C-09D0FEBA0011}"/>
-                </a:ext>
-              </a:extLst>
-            </p:cNvPr>
-            <p:cNvCxnSpPr>
-              <a:cxnSpLocks/>
-            </p:cNvCxnSpPr>
-            <p:nvPr/>
-          </p:nvCxnSpPr>
-          <p:spPr>
-            <a:xfrm>
-              <a:off x="6470603" y="6390010"/>
-              <a:ext cx="329378" cy="0"/>
-            </a:xfrm>
-            <a:prstGeom prst="straightConnector1">
-              <a:avLst/>
-            </a:prstGeom>
-            <a:ln w="19050">
-              <a:solidFill>
-                <a:schemeClr val="bg1"/>
-              </a:solidFill>
-              <a:tailEnd type="triangle"/>
-            </a:ln>
-          </p:spPr>
-          <p:style>
-            <a:lnRef idx="1">
-              <a:schemeClr val="accent1"/>
-            </a:lnRef>
-            <a:fillRef idx="0">
-              <a:schemeClr val="accent1"/>
-            </a:fillRef>
-            <a:effectRef idx="0">
-              <a:schemeClr val="accent1"/>
-            </a:effectRef>
-            <a:fontRef idx="minor">
-              <a:schemeClr val="tx1"/>
-            </a:fontRef>
-          </p:style>
-        </p:cxnSp>
-        <p:sp>
-          <p:nvSpPr>
-            <p:cNvPr id="37" name="TextBox 36">
-              <a:extLst>
-                <a:ext uri="{FF2B5EF4-FFF2-40B4-BE49-F238E27FC236}">
-                  <a16:creationId xmlns:a16="http://schemas.microsoft.com/office/drawing/2014/main" id="{9EB83A71-8136-48CC-87C9-4B68B450BFC6}"/>
-                </a:ext>
-              </a:extLst>
-            </p:cNvPr>
-            <p:cNvSpPr txBox="1"/>
-            <p:nvPr/>
-          </p:nvSpPr>
-          <p:spPr>
-            <a:xfrm>
-              <a:off x="6799981" y="6210393"/>
-              <a:ext cx="1308756" cy="369332"/>
-            </a:xfrm>
-            <a:prstGeom prst="rect">
-              <a:avLst/>
-            </a:prstGeom>
-            <a:noFill/>
-          </p:spPr>
-          <p:txBody>
-            <a:bodyPr wrap="none" rtlCol="0">
-              <a:spAutoFit/>
-            </a:bodyPr>
-            <a:lstStyle/>
-            <a:p>
-              <a:r>
-                <a:rPr lang="en-US" dirty="0">
-                  <a:solidFill>
-                    <a:schemeClr val="bg1"/>
-                  </a:solidFill>
-                </a:rPr>
-                <a:t>Air Pressure</a:t>
-              </a:r>
-            </a:p>
-          </p:txBody>
-        </p:sp>
-        <p:sp>
-          <p:nvSpPr>
-            <p:cNvPr id="38" name="Rectangle 37">
-              <a:extLst>
-                <a:ext uri="{FF2B5EF4-FFF2-40B4-BE49-F238E27FC236}">
-                  <a16:creationId xmlns:a16="http://schemas.microsoft.com/office/drawing/2014/main" id="{C1318E94-D693-4769-AAFA-B752A3B3D9F0}"/>
-                </a:ext>
-              </a:extLst>
-            </p:cNvPr>
-            <p:cNvSpPr/>
-            <p:nvPr/>
-          </p:nvSpPr>
-          <p:spPr>
-            <a:xfrm>
-              <a:off x="6230329" y="1546028"/>
-              <a:ext cx="1669517" cy="896702"/>
-            </a:xfrm>
-            <a:prstGeom prst="rect">
-              <a:avLst/>
-            </a:prstGeom>
-          </p:spPr>
-          <p:style>
-            <a:lnRef idx="2">
-              <a:schemeClr val="accent6">
-                <a:shade val="50000"/>
-              </a:schemeClr>
-            </a:lnRef>
-            <a:fillRef idx="1">
-              <a:schemeClr val="accent6"/>
-            </a:fillRef>
-            <a:effectRef idx="0">
-              <a:schemeClr val="accent6"/>
-            </a:effectRef>
-            <a:fontRef idx="minor">
-              <a:schemeClr val="lt1"/>
-            </a:fontRef>
-          </p:style>
-          <p:txBody>
-            <a:bodyPr rtlCol="0" anchor="ctr"/>
-            <a:lstStyle/>
-            <a:p>
-              <a:pPr algn="ctr"/>
-              <a:r>
-                <a:rPr lang="en-US" dirty="0"/>
-                <a:t>User Input </a:t>
-              </a:r>
-              <a:r>
-                <a:rPr lang="en-US" b="1" dirty="0">
-                  <a:solidFill>
-                    <a:srgbClr val="FFFF00"/>
-                  </a:solidFill>
-                </a:rPr>
-                <a:t>Button</a:t>
-              </a:r>
-            </a:p>
-          </p:txBody>
-        </p:sp>
-        <p:cxnSp>
-          <p:nvCxnSpPr>
-            <p:cNvPr id="39" name="Straight Arrow Connector 38">
-              <a:extLst>
-                <a:ext uri="{FF2B5EF4-FFF2-40B4-BE49-F238E27FC236}">
-                  <a16:creationId xmlns:a16="http://schemas.microsoft.com/office/drawing/2014/main" id="{AF3D3040-A9A5-431A-8AB7-6743C216A6CD}"/>
-                </a:ext>
-              </a:extLst>
-            </p:cNvPr>
-            <p:cNvCxnSpPr>
-              <a:cxnSpLocks/>
-            </p:cNvCxnSpPr>
-            <p:nvPr/>
-          </p:nvCxnSpPr>
-          <p:spPr>
-            <a:xfrm>
-              <a:off x="7065088" y="2442730"/>
-              <a:ext cx="0" cy="1635199"/>
-            </a:xfrm>
-            <a:prstGeom prst="straightConnector1">
-              <a:avLst/>
-            </a:prstGeom>
-            <a:ln w="19050">
-              <a:solidFill>
-                <a:schemeClr val="bg1"/>
-              </a:solidFill>
-              <a:tailEnd type="triangle"/>
-            </a:ln>
-          </p:spPr>
-          <p:style>
-            <a:lnRef idx="1">
-              <a:schemeClr val="accent1"/>
-            </a:lnRef>
-            <a:fillRef idx="0">
-              <a:schemeClr val="accent1"/>
-            </a:fillRef>
-            <a:effectRef idx="0">
-              <a:schemeClr val="accent1"/>
-            </a:effectRef>
-            <a:fontRef idx="minor">
-              <a:schemeClr val="tx1"/>
-            </a:fontRef>
-          </p:style>
-        </p:cxnSp>
-        <p:cxnSp>
-          <p:nvCxnSpPr>
-            <p:cNvPr id="41" name="Straight Arrow Connector 40">
-              <a:extLst>
-                <a:ext uri="{FF2B5EF4-FFF2-40B4-BE49-F238E27FC236}">
-                  <a16:creationId xmlns:a16="http://schemas.microsoft.com/office/drawing/2014/main" id="{D0B84A33-80F4-4FBA-9113-71E507CC41D3}"/>
-                </a:ext>
-              </a:extLst>
-            </p:cNvPr>
-            <p:cNvCxnSpPr>
-              <a:cxnSpLocks/>
-              <a:stCxn id="6" idx="3"/>
-              <a:endCxn id="9" idx="1"/>
-            </p:cNvCxnSpPr>
-            <p:nvPr/>
-          </p:nvCxnSpPr>
-          <p:spPr>
-            <a:xfrm>
-              <a:off x="3680217" y="4517976"/>
-              <a:ext cx="469977" cy="0"/>
-            </a:xfrm>
-            <a:prstGeom prst="straightConnector1">
-              <a:avLst/>
-            </a:prstGeom>
-            <a:ln w="19050">
-              <a:solidFill>
-                <a:schemeClr val="bg1"/>
-              </a:solidFill>
-              <a:tailEnd type="triangle"/>
-            </a:ln>
-          </p:spPr>
-          <p:style>
-            <a:lnRef idx="1">
-              <a:schemeClr val="accent1"/>
-            </a:lnRef>
-            <a:fillRef idx="0">
-              <a:schemeClr val="accent1"/>
-            </a:fillRef>
-            <a:effectRef idx="0">
-              <a:schemeClr val="accent1"/>
-            </a:effectRef>
-            <a:fontRef idx="minor">
-              <a:schemeClr val="tx1"/>
-            </a:fontRef>
-          </p:style>
-        </p:cxnSp>
-      </p:grpSp>
+        </p:nvSpPr>
+        <p:spPr>
+          <a:xfrm>
+            <a:off x="7400736" y="4077929"/>
+            <a:ext cx="1669517" cy="896702"/>
+          </a:xfrm>
+          <a:prstGeom prst="rect">
+            <a:avLst/>
+          </a:prstGeom>
+        </p:spPr>
+        <p:style>
+          <a:lnRef idx="2">
+            <a:schemeClr val="accent1">
+              <a:shade val="50000"/>
+            </a:schemeClr>
+          </a:lnRef>
+          <a:fillRef idx="1">
+            <a:schemeClr val="accent1"/>
+          </a:fillRef>
+          <a:effectRef idx="0">
+            <a:schemeClr val="accent1"/>
+          </a:effectRef>
+          <a:fontRef idx="minor">
+            <a:schemeClr val="lt1"/>
+          </a:fontRef>
+        </p:style>
+        <p:txBody>
+          <a:bodyPr rtlCol="0" anchor="ctr"/>
+          <a:lstStyle/>
+          <a:p>
+            <a:pPr algn="ctr"/>
+            <a:r>
+              <a:rPr lang="en-US" dirty="0"/>
+              <a:t>Server Generates </a:t>
+            </a:r>
+            <a:r>
+              <a:rPr lang="en-US" b="1" dirty="0">
+                <a:solidFill>
+                  <a:srgbClr val="FFFF00"/>
+                </a:solidFill>
+              </a:rPr>
+              <a:t>iCalendar File</a:t>
+            </a:r>
+          </a:p>
+        </p:txBody>
+      </p:sp>
+      <p:sp>
+        <p:nvSpPr>
+          <p:cNvPr id="6" name="Rectangle 5">
+            <a:extLst>
+              <a:ext uri="{FF2B5EF4-FFF2-40B4-BE49-F238E27FC236}">
+                <a16:creationId xmlns:a16="http://schemas.microsoft.com/office/drawing/2014/main" id="{BFF2225A-C7BE-4C40-B635-213D14A57082}"/>
+              </a:ext>
+            </a:extLst>
+          </p:cNvPr>
+          <p:cNvSpPr/>
+          <p:nvPr/>
+        </p:nvSpPr>
+        <p:spPr>
+          <a:xfrm>
+            <a:off x="959015" y="4069625"/>
+            <a:ext cx="1669517" cy="896702"/>
+          </a:xfrm>
+          <a:prstGeom prst="rect">
+            <a:avLst/>
+          </a:prstGeom>
+        </p:spPr>
+        <p:style>
+          <a:lnRef idx="2">
+            <a:schemeClr val="accent1">
+              <a:shade val="50000"/>
+            </a:schemeClr>
+          </a:lnRef>
+          <a:fillRef idx="1">
+            <a:schemeClr val="accent1"/>
+          </a:fillRef>
+          <a:effectRef idx="0">
+            <a:schemeClr val="accent1"/>
+          </a:effectRef>
+          <a:fontRef idx="minor">
+            <a:schemeClr val="lt1"/>
+          </a:fontRef>
+        </p:style>
+        <p:txBody>
+          <a:bodyPr rtlCol="0" anchor="ctr"/>
+          <a:lstStyle/>
+          <a:p>
+            <a:pPr algn="ctr"/>
+            <a:r>
+              <a:rPr lang="en-US" dirty="0"/>
+              <a:t>Zip Code API</a:t>
+            </a:r>
+          </a:p>
+          <a:p>
+            <a:pPr algn="ctr"/>
+            <a:r>
+              <a:rPr lang="en-US" b="1" dirty="0">
+                <a:solidFill>
+                  <a:srgbClr val="FFFF00"/>
+                </a:solidFill>
+              </a:rPr>
+              <a:t>Latitude, Longitude</a:t>
+            </a:r>
+          </a:p>
+        </p:txBody>
+      </p:sp>
+      <p:sp>
+        <p:nvSpPr>
+          <p:cNvPr id="9" name="Rectangle 8">
+            <a:extLst>
+              <a:ext uri="{FF2B5EF4-FFF2-40B4-BE49-F238E27FC236}">
+                <a16:creationId xmlns:a16="http://schemas.microsoft.com/office/drawing/2014/main" id="{112CA398-796B-4A36-9D44-16C68F55F3D4}"/>
+              </a:ext>
+            </a:extLst>
+          </p:cNvPr>
+          <p:cNvSpPr/>
+          <p:nvPr/>
+        </p:nvSpPr>
+        <p:spPr>
+          <a:xfrm>
+            <a:off x="3098509" y="4069625"/>
+            <a:ext cx="1669517" cy="896702"/>
+          </a:xfrm>
+          <a:prstGeom prst="rect">
+            <a:avLst/>
+          </a:prstGeom>
+        </p:spPr>
+        <p:style>
+          <a:lnRef idx="2">
+            <a:schemeClr val="accent1">
+              <a:shade val="50000"/>
+            </a:schemeClr>
+          </a:lnRef>
+          <a:fillRef idx="1">
+            <a:schemeClr val="accent1"/>
+          </a:fillRef>
+          <a:effectRef idx="0">
+            <a:schemeClr val="accent1"/>
+          </a:effectRef>
+          <a:fontRef idx="minor">
+            <a:schemeClr val="lt1"/>
+          </a:fontRef>
+        </p:style>
+        <p:txBody>
+          <a:bodyPr rtlCol="0" anchor="ctr"/>
+          <a:lstStyle/>
+          <a:p>
+            <a:pPr algn="ctr"/>
+            <a:r>
+              <a:rPr lang="en-US" dirty="0"/>
+              <a:t>Weather API</a:t>
+            </a:r>
+          </a:p>
+          <a:p>
+            <a:pPr algn="ctr"/>
+            <a:r>
+              <a:rPr lang="en-US" b="1" dirty="0">
+                <a:solidFill>
+                  <a:srgbClr val="FFFF00"/>
+                </a:solidFill>
+              </a:rPr>
+              <a:t>Station, Data</a:t>
+            </a:r>
+          </a:p>
+        </p:txBody>
+      </p:sp>
+      <p:cxnSp>
+        <p:nvCxnSpPr>
+          <p:cNvPr id="11" name="Straight Arrow Connector 10">
+            <a:extLst>
+              <a:ext uri="{FF2B5EF4-FFF2-40B4-BE49-F238E27FC236}">
+                <a16:creationId xmlns:a16="http://schemas.microsoft.com/office/drawing/2014/main" id="{A42A331A-7A1F-4E93-9E9B-B8B6D541D02A}"/>
+              </a:ext>
+            </a:extLst>
+          </p:cNvPr>
+          <p:cNvCxnSpPr>
+            <a:cxnSpLocks/>
+            <a:endCxn id="13" idx="1"/>
+          </p:cNvCxnSpPr>
+          <p:nvPr/>
+        </p:nvCxnSpPr>
+        <p:spPr>
+          <a:xfrm>
+            <a:off x="4768026" y="4517976"/>
+            <a:ext cx="469978" cy="0"/>
+          </a:xfrm>
+          <a:prstGeom prst="straightConnector1">
+            <a:avLst/>
+          </a:prstGeom>
+          <a:ln w="19050">
+            <a:solidFill>
+              <a:schemeClr val="bg1"/>
+            </a:solidFill>
+            <a:tailEnd type="triangle"/>
+          </a:ln>
+        </p:spPr>
+        <p:style>
+          <a:lnRef idx="1">
+            <a:schemeClr val="accent1"/>
+          </a:lnRef>
+          <a:fillRef idx="0">
+            <a:schemeClr val="accent1"/>
+          </a:fillRef>
+          <a:effectRef idx="0">
+            <a:schemeClr val="accent1"/>
+          </a:effectRef>
+          <a:fontRef idx="minor">
+            <a:schemeClr val="tx1"/>
+          </a:fontRef>
+        </p:style>
+      </p:cxnSp>
+      <p:sp>
+        <p:nvSpPr>
+          <p:cNvPr id="13" name="Rectangle 12">
+            <a:extLst>
+              <a:ext uri="{FF2B5EF4-FFF2-40B4-BE49-F238E27FC236}">
+                <a16:creationId xmlns:a16="http://schemas.microsoft.com/office/drawing/2014/main" id="{68130133-2AE8-4B8B-B13A-EECB0FA92935}"/>
+              </a:ext>
+            </a:extLst>
+          </p:cNvPr>
+          <p:cNvSpPr/>
+          <p:nvPr/>
+        </p:nvSpPr>
+        <p:spPr>
+          <a:xfrm>
+            <a:off x="5238004" y="4069625"/>
+            <a:ext cx="1669517" cy="896702"/>
+          </a:xfrm>
+          <a:prstGeom prst="rect">
+            <a:avLst/>
+          </a:prstGeom>
+        </p:spPr>
+        <p:style>
+          <a:lnRef idx="2">
+            <a:schemeClr val="accent1">
+              <a:shade val="50000"/>
+            </a:schemeClr>
+          </a:lnRef>
+          <a:fillRef idx="1">
+            <a:schemeClr val="accent1"/>
+          </a:fillRef>
+          <a:effectRef idx="0">
+            <a:schemeClr val="accent1"/>
+          </a:effectRef>
+          <a:fontRef idx="minor">
+            <a:schemeClr val="lt1"/>
+          </a:fontRef>
+        </p:style>
+        <p:txBody>
+          <a:bodyPr rtlCol="0" anchor="ctr"/>
+          <a:lstStyle/>
+          <a:p>
+            <a:pPr algn="ctr"/>
+            <a:r>
+              <a:rPr lang="en-US" dirty="0"/>
+              <a:t>App Displays</a:t>
+            </a:r>
+          </a:p>
+          <a:p>
+            <a:pPr algn="ctr"/>
+            <a:r>
+              <a:rPr lang="en-US" b="1" dirty="0">
+                <a:solidFill>
+                  <a:srgbClr val="FFFF00"/>
+                </a:solidFill>
+              </a:rPr>
+              <a:t>Formatted Report</a:t>
+            </a:r>
+          </a:p>
+        </p:txBody>
+      </p:sp>
+      <p:cxnSp>
+        <p:nvCxnSpPr>
+          <p:cNvPr id="22" name="Straight Arrow Connector 21">
+            <a:extLst>
+              <a:ext uri="{FF2B5EF4-FFF2-40B4-BE49-F238E27FC236}">
+                <a16:creationId xmlns:a16="http://schemas.microsoft.com/office/drawing/2014/main" id="{3072DE0D-CEBE-40DD-B064-72FACE193D19}"/>
+              </a:ext>
+            </a:extLst>
+          </p:cNvPr>
+          <p:cNvCxnSpPr>
+            <a:cxnSpLocks/>
+          </p:cNvCxnSpPr>
+          <p:nvPr/>
+        </p:nvCxnSpPr>
+        <p:spPr>
+          <a:xfrm>
+            <a:off x="5418918" y="5154950"/>
+            <a:ext cx="329378" cy="0"/>
+          </a:xfrm>
+          <a:prstGeom prst="straightConnector1">
+            <a:avLst/>
+          </a:prstGeom>
+          <a:ln w="19050">
+            <a:solidFill>
+              <a:schemeClr val="bg1"/>
+            </a:solidFill>
+            <a:tailEnd type="triangle"/>
+          </a:ln>
+        </p:spPr>
+        <p:style>
+          <a:lnRef idx="1">
+            <a:schemeClr val="accent1"/>
+          </a:lnRef>
+          <a:fillRef idx="0">
+            <a:schemeClr val="accent1"/>
+          </a:fillRef>
+          <a:effectRef idx="0">
+            <a:schemeClr val="accent1"/>
+          </a:effectRef>
+          <a:fontRef idx="minor">
+            <a:schemeClr val="tx1"/>
+          </a:fontRef>
+        </p:style>
+      </p:cxnSp>
+      <p:cxnSp>
+        <p:nvCxnSpPr>
+          <p:cNvPr id="25" name="Straight Connector 24">
+            <a:extLst>
+              <a:ext uri="{FF2B5EF4-FFF2-40B4-BE49-F238E27FC236}">
+                <a16:creationId xmlns:a16="http://schemas.microsoft.com/office/drawing/2014/main" id="{205FED8B-250D-4025-AFB8-F828545D1D18}"/>
+              </a:ext>
+            </a:extLst>
+          </p:cNvPr>
+          <p:cNvCxnSpPr>
+            <a:cxnSpLocks/>
+          </p:cNvCxnSpPr>
+          <p:nvPr/>
+        </p:nvCxnSpPr>
+        <p:spPr>
+          <a:xfrm>
+            <a:off x="5418918" y="4966326"/>
+            <a:ext cx="0" cy="1512628"/>
+          </a:xfrm>
+          <a:prstGeom prst="line">
+            <a:avLst/>
+          </a:prstGeom>
+          <a:ln w="19050">
+            <a:solidFill>
+              <a:schemeClr val="bg1"/>
+            </a:solidFill>
+          </a:ln>
+        </p:spPr>
+        <p:style>
+          <a:lnRef idx="1">
+            <a:schemeClr val="accent1"/>
+          </a:lnRef>
+          <a:fillRef idx="0">
+            <a:schemeClr val="accent1"/>
+          </a:fillRef>
+          <a:effectRef idx="0">
+            <a:schemeClr val="accent1"/>
+          </a:effectRef>
+          <a:fontRef idx="minor">
+            <a:schemeClr val="tx1"/>
+          </a:fontRef>
+        </p:style>
+      </p:cxnSp>
+      <p:cxnSp>
+        <p:nvCxnSpPr>
+          <p:cNvPr id="26" name="Straight Arrow Connector 25">
+            <a:extLst>
+              <a:ext uri="{FF2B5EF4-FFF2-40B4-BE49-F238E27FC236}">
+                <a16:creationId xmlns:a16="http://schemas.microsoft.com/office/drawing/2014/main" id="{5191192C-B86A-4B96-9FD1-3E45D30476E8}"/>
+              </a:ext>
+            </a:extLst>
+          </p:cNvPr>
+          <p:cNvCxnSpPr>
+            <a:cxnSpLocks/>
+          </p:cNvCxnSpPr>
+          <p:nvPr/>
+        </p:nvCxnSpPr>
+        <p:spPr>
+          <a:xfrm>
+            <a:off x="5418918" y="5432220"/>
+            <a:ext cx="329378" cy="0"/>
+          </a:xfrm>
+          <a:prstGeom prst="straightConnector1">
+            <a:avLst/>
+          </a:prstGeom>
+          <a:ln w="19050">
+            <a:solidFill>
+              <a:schemeClr val="bg1"/>
+            </a:solidFill>
+            <a:tailEnd type="triangle"/>
+          </a:ln>
+        </p:spPr>
+        <p:style>
+          <a:lnRef idx="1">
+            <a:schemeClr val="accent1"/>
+          </a:lnRef>
+          <a:fillRef idx="0">
+            <a:schemeClr val="accent1"/>
+          </a:fillRef>
+          <a:effectRef idx="0">
+            <a:schemeClr val="accent1"/>
+          </a:effectRef>
+          <a:fontRef idx="minor">
+            <a:schemeClr val="tx1"/>
+          </a:fontRef>
+        </p:style>
+      </p:cxnSp>
+      <p:cxnSp>
+        <p:nvCxnSpPr>
+          <p:cNvPr id="27" name="Straight Arrow Connector 26">
+            <a:extLst>
+              <a:ext uri="{FF2B5EF4-FFF2-40B4-BE49-F238E27FC236}">
+                <a16:creationId xmlns:a16="http://schemas.microsoft.com/office/drawing/2014/main" id="{E152CC7A-E1C0-435A-BC0E-7C6A00D9653F}"/>
+              </a:ext>
+            </a:extLst>
+          </p:cNvPr>
+          <p:cNvCxnSpPr>
+            <a:cxnSpLocks/>
+          </p:cNvCxnSpPr>
+          <p:nvPr/>
+        </p:nvCxnSpPr>
+        <p:spPr>
+          <a:xfrm>
+            <a:off x="5418918" y="5685893"/>
+            <a:ext cx="329378" cy="0"/>
+          </a:xfrm>
+          <a:prstGeom prst="straightConnector1">
+            <a:avLst/>
+          </a:prstGeom>
+          <a:ln w="19050">
+            <a:solidFill>
+              <a:schemeClr val="bg1"/>
+            </a:solidFill>
+            <a:tailEnd type="triangle"/>
+          </a:ln>
+        </p:spPr>
+        <p:style>
+          <a:lnRef idx="1">
+            <a:schemeClr val="accent1"/>
+          </a:lnRef>
+          <a:fillRef idx="0">
+            <a:schemeClr val="accent1"/>
+          </a:fillRef>
+          <a:effectRef idx="0">
+            <a:schemeClr val="accent1"/>
+          </a:effectRef>
+          <a:fontRef idx="minor">
+            <a:schemeClr val="tx1"/>
+          </a:fontRef>
+        </p:style>
+      </p:cxnSp>
+      <p:cxnSp>
+        <p:nvCxnSpPr>
+          <p:cNvPr id="28" name="Straight Arrow Connector 27">
+            <a:extLst>
+              <a:ext uri="{FF2B5EF4-FFF2-40B4-BE49-F238E27FC236}">
+                <a16:creationId xmlns:a16="http://schemas.microsoft.com/office/drawing/2014/main" id="{09252162-A5D1-4367-9C42-E7ADD9C571A4}"/>
+              </a:ext>
+            </a:extLst>
+          </p:cNvPr>
+          <p:cNvCxnSpPr>
+            <a:cxnSpLocks/>
+          </p:cNvCxnSpPr>
+          <p:nvPr/>
+        </p:nvCxnSpPr>
+        <p:spPr>
+          <a:xfrm>
+            <a:off x="5418918" y="5933665"/>
+            <a:ext cx="329378" cy="0"/>
+          </a:xfrm>
+          <a:prstGeom prst="straightConnector1">
+            <a:avLst/>
+          </a:prstGeom>
+          <a:ln w="19050">
+            <a:solidFill>
+              <a:schemeClr val="bg1"/>
+            </a:solidFill>
+            <a:tailEnd type="triangle"/>
+          </a:ln>
+        </p:spPr>
+        <p:style>
+          <a:lnRef idx="1">
+            <a:schemeClr val="accent1"/>
+          </a:lnRef>
+          <a:fillRef idx="0">
+            <a:schemeClr val="accent1"/>
+          </a:fillRef>
+          <a:effectRef idx="0">
+            <a:schemeClr val="accent1"/>
+          </a:effectRef>
+          <a:fontRef idx="minor">
+            <a:schemeClr val="tx1"/>
+          </a:fontRef>
+        </p:style>
+      </p:cxnSp>
+      <p:sp>
+        <p:nvSpPr>
+          <p:cNvPr id="29" name="TextBox 28">
+            <a:extLst>
+              <a:ext uri="{FF2B5EF4-FFF2-40B4-BE49-F238E27FC236}">
+                <a16:creationId xmlns:a16="http://schemas.microsoft.com/office/drawing/2014/main" id="{3D0C7F44-A5E1-4F68-BEDF-06C338A75DF1}"/>
+              </a:ext>
+            </a:extLst>
+          </p:cNvPr>
+          <p:cNvSpPr txBox="1"/>
+          <p:nvPr/>
+        </p:nvSpPr>
+        <p:spPr>
+          <a:xfrm>
+            <a:off x="5748296" y="4982936"/>
+            <a:ext cx="1388585" cy="369332"/>
+          </a:xfrm>
+          <a:prstGeom prst="rect">
+            <a:avLst/>
+          </a:prstGeom>
+          <a:noFill/>
+        </p:spPr>
+        <p:txBody>
+          <a:bodyPr wrap="none" rtlCol="0">
+            <a:spAutoFit/>
+          </a:bodyPr>
+          <a:lstStyle/>
+          <a:p>
+            <a:r>
+              <a:rPr lang="en-US" dirty="0">
+                <a:solidFill>
+                  <a:schemeClr val="bg1"/>
+                </a:solidFill>
+              </a:rPr>
+              <a:t>Temperature</a:t>
+            </a:r>
+          </a:p>
+        </p:txBody>
+      </p:sp>
+      <p:sp>
+        <p:nvSpPr>
+          <p:cNvPr id="30" name="TextBox 29">
+            <a:extLst>
+              <a:ext uri="{FF2B5EF4-FFF2-40B4-BE49-F238E27FC236}">
+                <a16:creationId xmlns:a16="http://schemas.microsoft.com/office/drawing/2014/main" id="{AA753716-696E-46B2-8648-EC626420E2B7}"/>
+              </a:ext>
+            </a:extLst>
+          </p:cNvPr>
+          <p:cNvSpPr txBox="1"/>
+          <p:nvPr/>
+        </p:nvSpPr>
+        <p:spPr>
+          <a:xfrm>
+            <a:off x="5748296" y="5248407"/>
+            <a:ext cx="1043876" cy="369332"/>
+          </a:xfrm>
+          <a:prstGeom prst="rect">
+            <a:avLst/>
+          </a:prstGeom>
+          <a:noFill/>
+        </p:spPr>
+        <p:txBody>
+          <a:bodyPr wrap="none" rtlCol="0">
+            <a:spAutoFit/>
+          </a:bodyPr>
+          <a:lstStyle/>
+          <a:p>
+            <a:r>
+              <a:rPr lang="en-US" dirty="0">
+                <a:solidFill>
+                  <a:schemeClr val="bg1"/>
+                </a:solidFill>
+              </a:rPr>
+              <a:t>Humidity</a:t>
+            </a:r>
+          </a:p>
+        </p:txBody>
+      </p:sp>
+      <p:sp>
+        <p:nvSpPr>
+          <p:cNvPr id="31" name="TextBox 30">
+            <a:extLst>
+              <a:ext uri="{FF2B5EF4-FFF2-40B4-BE49-F238E27FC236}">
+                <a16:creationId xmlns:a16="http://schemas.microsoft.com/office/drawing/2014/main" id="{97AE06FE-E0FC-4C2A-9A69-06586458E310}"/>
+              </a:ext>
+            </a:extLst>
+          </p:cNvPr>
+          <p:cNvSpPr txBox="1"/>
+          <p:nvPr/>
+        </p:nvSpPr>
+        <p:spPr>
+          <a:xfrm>
+            <a:off x="5748296" y="5505961"/>
+            <a:ext cx="1613327" cy="369332"/>
+          </a:xfrm>
+          <a:prstGeom prst="rect">
+            <a:avLst/>
+          </a:prstGeom>
+          <a:noFill/>
+        </p:spPr>
+        <p:txBody>
+          <a:bodyPr wrap="none" rtlCol="0">
+            <a:spAutoFit/>
+          </a:bodyPr>
+          <a:lstStyle/>
+          <a:p>
+            <a:r>
+              <a:rPr lang="en-US" dirty="0">
+                <a:solidFill>
+                  <a:schemeClr val="bg1"/>
+                </a:solidFill>
+              </a:rPr>
+              <a:t>Sunrise, Sunset</a:t>
+            </a:r>
+          </a:p>
+        </p:txBody>
+      </p:sp>
+      <p:sp>
+        <p:nvSpPr>
+          <p:cNvPr id="32" name="TextBox 31">
+            <a:extLst>
+              <a:ext uri="{FF2B5EF4-FFF2-40B4-BE49-F238E27FC236}">
+                <a16:creationId xmlns:a16="http://schemas.microsoft.com/office/drawing/2014/main" id="{93295AC2-A50F-4FB6-87AB-9C412A7AB012}"/>
+              </a:ext>
+            </a:extLst>
+          </p:cNvPr>
+          <p:cNvSpPr txBox="1"/>
+          <p:nvPr/>
+        </p:nvSpPr>
+        <p:spPr>
+          <a:xfrm>
+            <a:off x="5748296" y="5754048"/>
+            <a:ext cx="2289601" cy="369332"/>
+          </a:xfrm>
+          <a:prstGeom prst="rect">
+            <a:avLst/>
+          </a:prstGeom>
+          <a:noFill/>
+        </p:spPr>
+        <p:txBody>
+          <a:bodyPr wrap="none" rtlCol="0">
+            <a:spAutoFit/>
+          </a:bodyPr>
+          <a:lstStyle/>
+          <a:p>
+            <a:r>
+              <a:rPr lang="en-US" dirty="0">
+                <a:solidFill>
+                  <a:schemeClr val="bg1"/>
+                </a:solidFill>
+              </a:rPr>
+              <a:t>Wind Speed, Direction</a:t>
+            </a:r>
+          </a:p>
+        </p:txBody>
+      </p:sp>
+      <p:sp>
+        <p:nvSpPr>
+          <p:cNvPr id="35" name="Rectangle 34">
+            <a:extLst>
+              <a:ext uri="{FF2B5EF4-FFF2-40B4-BE49-F238E27FC236}">
+                <a16:creationId xmlns:a16="http://schemas.microsoft.com/office/drawing/2014/main" id="{082ACA58-644F-461B-B9BF-40964C008351}"/>
+              </a:ext>
+            </a:extLst>
+          </p:cNvPr>
+          <p:cNvSpPr/>
+          <p:nvPr/>
+        </p:nvSpPr>
+        <p:spPr>
+          <a:xfrm>
+            <a:off x="959015" y="1546028"/>
+            <a:ext cx="1669517" cy="896702"/>
+          </a:xfrm>
+          <a:prstGeom prst="rect">
+            <a:avLst/>
+          </a:prstGeom>
+        </p:spPr>
+        <p:style>
+          <a:lnRef idx="2">
+            <a:schemeClr val="accent6">
+              <a:shade val="50000"/>
+            </a:schemeClr>
+          </a:lnRef>
+          <a:fillRef idx="1">
+            <a:schemeClr val="accent6"/>
+          </a:fillRef>
+          <a:effectRef idx="0">
+            <a:schemeClr val="accent6"/>
+          </a:effectRef>
+          <a:fontRef idx="minor">
+            <a:schemeClr val="lt1"/>
+          </a:fontRef>
+        </p:style>
+        <p:txBody>
+          <a:bodyPr rtlCol="0" anchor="ctr"/>
+          <a:lstStyle/>
+          <a:p>
+            <a:pPr algn="ctr"/>
+            <a:r>
+              <a:rPr lang="en-US" dirty="0"/>
+              <a:t>User Input </a:t>
+            </a:r>
+          </a:p>
+          <a:p>
+            <a:pPr algn="ctr"/>
+            <a:r>
+              <a:rPr lang="en-US" b="1" dirty="0">
+                <a:solidFill>
+                  <a:srgbClr val="FFFF00"/>
+                </a:solidFill>
+              </a:rPr>
+              <a:t>Zip Code</a:t>
+            </a:r>
+          </a:p>
+        </p:txBody>
+      </p:sp>
+      <p:cxnSp>
+        <p:nvCxnSpPr>
+          <p:cNvPr id="36" name="Straight Arrow Connector 35">
+            <a:extLst>
+              <a:ext uri="{FF2B5EF4-FFF2-40B4-BE49-F238E27FC236}">
+                <a16:creationId xmlns:a16="http://schemas.microsoft.com/office/drawing/2014/main" id="{316B1166-9533-406C-85F1-AF6664203874}"/>
+              </a:ext>
+            </a:extLst>
+          </p:cNvPr>
+          <p:cNvCxnSpPr>
+            <a:cxnSpLocks/>
+            <a:stCxn id="35" idx="2"/>
+            <a:endCxn id="6" idx="0"/>
+          </p:cNvCxnSpPr>
+          <p:nvPr/>
+        </p:nvCxnSpPr>
+        <p:spPr>
+          <a:xfrm>
+            <a:off x="1793774" y="2442730"/>
+            <a:ext cx="0" cy="1626895"/>
+          </a:xfrm>
+          <a:prstGeom prst="straightConnector1">
+            <a:avLst/>
+          </a:prstGeom>
+          <a:ln w="19050">
+            <a:solidFill>
+              <a:schemeClr val="bg1"/>
+            </a:solidFill>
+            <a:tailEnd type="triangle"/>
+          </a:ln>
+        </p:spPr>
+        <p:style>
+          <a:lnRef idx="1">
+            <a:schemeClr val="accent1"/>
+          </a:lnRef>
+          <a:fillRef idx="0">
+            <a:schemeClr val="accent1"/>
+          </a:fillRef>
+          <a:effectRef idx="0">
+            <a:schemeClr val="accent1"/>
+          </a:effectRef>
+          <a:fontRef idx="minor">
+            <a:schemeClr val="tx1"/>
+          </a:fontRef>
+        </p:style>
+      </p:cxnSp>
+      <p:cxnSp>
+        <p:nvCxnSpPr>
+          <p:cNvPr id="43" name="Straight Arrow Connector 42">
+            <a:extLst>
+              <a:ext uri="{FF2B5EF4-FFF2-40B4-BE49-F238E27FC236}">
+                <a16:creationId xmlns:a16="http://schemas.microsoft.com/office/drawing/2014/main" id="{C62DD7BC-4499-48E8-BFA0-9873170FF96B}"/>
+              </a:ext>
+            </a:extLst>
+          </p:cNvPr>
+          <p:cNvCxnSpPr>
+            <a:cxnSpLocks/>
+            <a:endCxn id="4" idx="1"/>
+          </p:cNvCxnSpPr>
+          <p:nvPr/>
+        </p:nvCxnSpPr>
+        <p:spPr>
+          <a:xfrm>
+            <a:off x="6907521" y="4526280"/>
+            <a:ext cx="493215" cy="0"/>
+          </a:xfrm>
+          <a:prstGeom prst="straightConnector1">
+            <a:avLst/>
+          </a:prstGeom>
+          <a:ln w="19050">
+            <a:solidFill>
+              <a:schemeClr val="bg1"/>
+            </a:solidFill>
+            <a:tailEnd type="triangle"/>
+          </a:ln>
+        </p:spPr>
+        <p:style>
+          <a:lnRef idx="1">
+            <a:schemeClr val="accent1"/>
+          </a:lnRef>
+          <a:fillRef idx="0">
+            <a:schemeClr val="accent1"/>
+          </a:fillRef>
+          <a:effectRef idx="0">
+            <a:schemeClr val="accent1"/>
+          </a:effectRef>
+          <a:fontRef idx="minor">
+            <a:schemeClr val="tx1"/>
+          </a:fontRef>
+        </p:style>
+      </p:cxnSp>
+      <p:sp>
+        <p:nvSpPr>
+          <p:cNvPr id="45" name="Rectangle 44">
+            <a:extLst>
+              <a:ext uri="{FF2B5EF4-FFF2-40B4-BE49-F238E27FC236}">
+                <a16:creationId xmlns:a16="http://schemas.microsoft.com/office/drawing/2014/main" id="{CB5C3700-C416-46E3-88A6-3F3DA4B3A869}"/>
+              </a:ext>
+            </a:extLst>
+          </p:cNvPr>
+          <p:cNvSpPr/>
+          <p:nvPr/>
+        </p:nvSpPr>
+        <p:spPr>
+          <a:xfrm>
+            <a:off x="7400736" y="1546028"/>
+            <a:ext cx="1669517" cy="896702"/>
+          </a:xfrm>
+          <a:prstGeom prst="rect">
+            <a:avLst/>
+          </a:prstGeom>
+        </p:spPr>
+        <p:style>
+          <a:lnRef idx="2">
+            <a:schemeClr val="accent6">
+              <a:shade val="50000"/>
+            </a:schemeClr>
+          </a:lnRef>
+          <a:fillRef idx="1">
+            <a:schemeClr val="accent6"/>
+          </a:fillRef>
+          <a:effectRef idx="0">
+            <a:schemeClr val="accent6"/>
+          </a:effectRef>
+          <a:fontRef idx="minor">
+            <a:schemeClr val="lt1"/>
+          </a:fontRef>
+        </p:style>
+        <p:txBody>
+          <a:bodyPr rtlCol="0" anchor="ctr"/>
+          <a:lstStyle/>
+          <a:p>
+            <a:pPr algn="ctr"/>
+            <a:r>
+              <a:rPr lang="en-US" dirty="0"/>
+              <a:t>User Input </a:t>
+            </a:r>
+            <a:r>
+              <a:rPr lang="en-US" b="1" dirty="0">
+                <a:solidFill>
+                  <a:srgbClr val="FFFF00"/>
+                </a:solidFill>
+              </a:rPr>
+              <a:t>Name, Email</a:t>
+            </a:r>
+          </a:p>
+        </p:txBody>
+      </p:sp>
+      <p:cxnSp>
+        <p:nvCxnSpPr>
+          <p:cNvPr id="46" name="Straight Arrow Connector 45">
+            <a:extLst>
+              <a:ext uri="{FF2B5EF4-FFF2-40B4-BE49-F238E27FC236}">
+                <a16:creationId xmlns:a16="http://schemas.microsoft.com/office/drawing/2014/main" id="{80F3D493-A5C5-4528-AC9B-00A843BB2AC9}"/>
+              </a:ext>
+            </a:extLst>
+          </p:cNvPr>
+          <p:cNvCxnSpPr>
+            <a:cxnSpLocks/>
+            <a:endCxn id="4" idx="0"/>
+          </p:cNvCxnSpPr>
+          <p:nvPr/>
+        </p:nvCxnSpPr>
+        <p:spPr>
+          <a:xfrm>
+            <a:off x="8235495" y="2442730"/>
+            <a:ext cx="0" cy="1635199"/>
+          </a:xfrm>
+          <a:prstGeom prst="straightConnector1">
+            <a:avLst/>
+          </a:prstGeom>
+          <a:ln w="19050">
+            <a:solidFill>
+              <a:schemeClr val="bg1"/>
+            </a:solidFill>
+            <a:tailEnd type="triangle"/>
+          </a:ln>
+        </p:spPr>
+        <p:style>
+          <a:lnRef idx="1">
+            <a:schemeClr val="accent1"/>
+          </a:lnRef>
+          <a:fillRef idx="0">
+            <a:schemeClr val="accent1"/>
+          </a:fillRef>
+          <a:effectRef idx="0">
+            <a:schemeClr val="accent1"/>
+          </a:effectRef>
+          <a:fontRef idx="minor">
+            <a:schemeClr val="tx1"/>
+          </a:fontRef>
+        </p:style>
+      </p:cxnSp>
+      <p:cxnSp>
+        <p:nvCxnSpPr>
+          <p:cNvPr id="33" name="Straight Arrow Connector 32">
+            <a:extLst>
+              <a:ext uri="{FF2B5EF4-FFF2-40B4-BE49-F238E27FC236}">
+                <a16:creationId xmlns:a16="http://schemas.microsoft.com/office/drawing/2014/main" id="{F13018D9-25F0-483C-978C-09D0FEBA0011}"/>
+              </a:ext>
+            </a:extLst>
+          </p:cNvPr>
+          <p:cNvCxnSpPr>
+            <a:cxnSpLocks/>
+          </p:cNvCxnSpPr>
+          <p:nvPr/>
+        </p:nvCxnSpPr>
+        <p:spPr>
+          <a:xfrm>
+            <a:off x="5418918" y="6189275"/>
+            <a:ext cx="329378" cy="0"/>
+          </a:xfrm>
+          <a:prstGeom prst="straightConnector1">
+            <a:avLst/>
+          </a:prstGeom>
+          <a:ln w="19050">
+            <a:solidFill>
+              <a:schemeClr val="bg1"/>
+            </a:solidFill>
+            <a:tailEnd type="triangle"/>
+          </a:ln>
+        </p:spPr>
+        <p:style>
+          <a:lnRef idx="1">
+            <a:schemeClr val="accent1"/>
+          </a:lnRef>
+          <a:fillRef idx="0">
+            <a:schemeClr val="accent1"/>
+          </a:fillRef>
+          <a:effectRef idx="0">
+            <a:schemeClr val="accent1"/>
+          </a:effectRef>
+          <a:fontRef idx="minor">
+            <a:schemeClr val="tx1"/>
+          </a:fontRef>
+        </p:style>
+      </p:cxnSp>
+      <p:sp>
+        <p:nvSpPr>
+          <p:cNvPr id="37" name="TextBox 36">
+            <a:extLst>
+              <a:ext uri="{FF2B5EF4-FFF2-40B4-BE49-F238E27FC236}">
+                <a16:creationId xmlns:a16="http://schemas.microsoft.com/office/drawing/2014/main" id="{9EB83A71-8136-48CC-87C9-4B68B450BFC6}"/>
+              </a:ext>
+            </a:extLst>
+          </p:cNvPr>
+          <p:cNvSpPr txBox="1"/>
+          <p:nvPr/>
+        </p:nvSpPr>
+        <p:spPr>
+          <a:xfrm>
+            <a:off x="5748296" y="6009658"/>
+            <a:ext cx="1308756" cy="369332"/>
+          </a:xfrm>
+          <a:prstGeom prst="rect">
+            <a:avLst/>
+          </a:prstGeom>
+          <a:noFill/>
+        </p:spPr>
+        <p:txBody>
+          <a:bodyPr wrap="none" rtlCol="0">
+            <a:spAutoFit/>
+          </a:bodyPr>
+          <a:lstStyle/>
+          <a:p>
+            <a:r>
+              <a:rPr lang="en-US" dirty="0">
+                <a:solidFill>
+                  <a:schemeClr val="bg1"/>
+                </a:solidFill>
+              </a:rPr>
+              <a:t>Air Pressure</a:t>
+            </a:r>
+          </a:p>
+        </p:txBody>
+      </p:sp>
+      <p:sp>
+        <p:nvSpPr>
+          <p:cNvPr id="38" name="Rectangle 37">
+            <a:extLst>
+              <a:ext uri="{FF2B5EF4-FFF2-40B4-BE49-F238E27FC236}">
+                <a16:creationId xmlns:a16="http://schemas.microsoft.com/office/drawing/2014/main" id="{C1318E94-D693-4769-AAFA-B752A3B3D9F0}"/>
+              </a:ext>
+            </a:extLst>
+          </p:cNvPr>
+          <p:cNvSpPr/>
+          <p:nvPr/>
+        </p:nvSpPr>
+        <p:spPr>
+          <a:xfrm>
+            <a:off x="5178644" y="1546028"/>
+            <a:ext cx="1669517" cy="896702"/>
+          </a:xfrm>
+          <a:prstGeom prst="rect">
+            <a:avLst/>
+          </a:prstGeom>
+        </p:spPr>
+        <p:style>
+          <a:lnRef idx="2">
+            <a:schemeClr val="accent6">
+              <a:shade val="50000"/>
+            </a:schemeClr>
+          </a:lnRef>
+          <a:fillRef idx="1">
+            <a:schemeClr val="accent6"/>
+          </a:fillRef>
+          <a:effectRef idx="0">
+            <a:schemeClr val="accent6"/>
+          </a:effectRef>
+          <a:fontRef idx="minor">
+            <a:schemeClr val="lt1"/>
+          </a:fontRef>
+        </p:style>
+        <p:txBody>
+          <a:bodyPr rtlCol="0" anchor="ctr"/>
+          <a:lstStyle/>
+          <a:p>
+            <a:pPr algn="ctr"/>
+            <a:r>
+              <a:rPr lang="en-US" dirty="0"/>
+              <a:t>User Input </a:t>
+            </a:r>
+            <a:r>
+              <a:rPr lang="en-US" b="1" dirty="0">
+                <a:solidFill>
+                  <a:srgbClr val="FFFF00"/>
+                </a:solidFill>
+              </a:rPr>
+              <a:t>Submit Button</a:t>
+            </a:r>
+          </a:p>
+        </p:txBody>
+      </p:sp>
+      <p:cxnSp>
+        <p:nvCxnSpPr>
+          <p:cNvPr id="39" name="Straight Arrow Connector 38">
+            <a:extLst>
+              <a:ext uri="{FF2B5EF4-FFF2-40B4-BE49-F238E27FC236}">
+                <a16:creationId xmlns:a16="http://schemas.microsoft.com/office/drawing/2014/main" id="{AF3D3040-A9A5-431A-8AB7-6743C216A6CD}"/>
+              </a:ext>
+            </a:extLst>
+          </p:cNvPr>
+          <p:cNvCxnSpPr>
+            <a:cxnSpLocks/>
+          </p:cNvCxnSpPr>
+          <p:nvPr/>
+        </p:nvCxnSpPr>
+        <p:spPr>
+          <a:xfrm>
+            <a:off x="6013403" y="2442730"/>
+            <a:ext cx="0" cy="1635199"/>
+          </a:xfrm>
+          <a:prstGeom prst="straightConnector1">
+            <a:avLst/>
+          </a:prstGeom>
+          <a:ln w="19050">
+            <a:solidFill>
+              <a:schemeClr val="bg1"/>
+            </a:solidFill>
+            <a:tailEnd type="triangle"/>
+          </a:ln>
+        </p:spPr>
+        <p:style>
+          <a:lnRef idx="1">
+            <a:schemeClr val="accent1"/>
+          </a:lnRef>
+          <a:fillRef idx="0">
+            <a:schemeClr val="accent1"/>
+          </a:fillRef>
+          <a:effectRef idx="0">
+            <a:schemeClr val="accent1"/>
+          </a:effectRef>
+          <a:fontRef idx="minor">
+            <a:schemeClr val="tx1"/>
+          </a:fontRef>
+        </p:style>
+      </p:cxnSp>
+      <p:cxnSp>
+        <p:nvCxnSpPr>
+          <p:cNvPr id="41" name="Straight Arrow Connector 40">
+            <a:extLst>
+              <a:ext uri="{FF2B5EF4-FFF2-40B4-BE49-F238E27FC236}">
+                <a16:creationId xmlns:a16="http://schemas.microsoft.com/office/drawing/2014/main" id="{D0B84A33-80F4-4FBA-9113-71E507CC41D3}"/>
+              </a:ext>
+            </a:extLst>
+          </p:cNvPr>
+          <p:cNvCxnSpPr>
+            <a:cxnSpLocks/>
+            <a:stCxn id="6" idx="3"/>
+            <a:endCxn id="9" idx="1"/>
+          </p:cNvCxnSpPr>
+          <p:nvPr/>
+        </p:nvCxnSpPr>
+        <p:spPr>
+          <a:xfrm>
+            <a:off x="2628532" y="4517976"/>
+            <a:ext cx="469977" cy="0"/>
+          </a:xfrm>
+          <a:prstGeom prst="straightConnector1">
+            <a:avLst/>
+          </a:prstGeom>
+          <a:ln w="19050">
+            <a:solidFill>
+              <a:schemeClr val="bg1"/>
+            </a:solidFill>
+            <a:tailEnd type="triangle"/>
+          </a:ln>
+        </p:spPr>
+        <p:style>
+          <a:lnRef idx="1">
+            <a:schemeClr val="accent1"/>
+          </a:lnRef>
+          <a:fillRef idx="0">
+            <a:schemeClr val="accent1"/>
+          </a:fillRef>
+          <a:effectRef idx="0">
+            <a:schemeClr val="accent1"/>
+          </a:effectRef>
+          <a:fontRef idx="minor">
+            <a:schemeClr val="tx1"/>
+          </a:fontRef>
+        </p:style>
+      </p:cxnSp>
+      <p:sp>
+        <p:nvSpPr>
+          <p:cNvPr id="34" name="Rectangle 33">
+            <a:extLst>
+              <a:ext uri="{FF2B5EF4-FFF2-40B4-BE49-F238E27FC236}">
+                <a16:creationId xmlns:a16="http://schemas.microsoft.com/office/drawing/2014/main" id="{716A618F-171B-49F8-8F8D-2542E83CDA66}"/>
+              </a:ext>
+            </a:extLst>
+          </p:cNvPr>
+          <p:cNvSpPr/>
+          <p:nvPr/>
+        </p:nvSpPr>
+        <p:spPr>
+          <a:xfrm>
+            <a:off x="9563468" y="4077929"/>
+            <a:ext cx="1669517" cy="896702"/>
+          </a:xfrm>
+          <a:prstGeom prst="rect">
+            <a:avLst/>
+          </a:prstGeom>
+        </p:spPr>
+        <p:style>
+          <a:lnRef idx="2">
+            <a:schemeClr val="accent1">
+              <a:shade val="50000"/>
+            </a:schemeClr>
+          </a:lnRef>
+          <a:fillRef idx="1">
+            <a:schemeClr val="accent1"/>
+          </a:fillRef>
+          <a:effectRef idx="0">
+            <a:schemeClr val="accent1"/>
+          </a:effectRef>
+          <a:fontRef idx="minor">
+            <a:schemeClr val="lt1"/>
+          </a:fontRef>
+        </p:style>
+        <p:txBody>
+          <a:bodyPr rtlCol="0" anchor="ctr"/>
+          <a:lstStyle/>
+          <a:p>
+            <a:pPr algn="ctr"/>
+            <a:r>
+              <a:rPr lang="en-US" dirty="0"/>
+              <a:t>Server serves </a:t>
+            </a:r>
+            <a:r>
+              <a:rPr lang="en-US" b="1" dirty="0">
+                <a:solidFill>
+                  <a:srgbClr val="FFFF00"/>
+                </a:solidFill>
+              </a:rPr>
+              <a:t>iCalendar File</a:t>
+            </a:r>
+          </a:p>
+        </p:txBody>
+      </p:sp>
+      <p:cxnSp>
+        <p:nvCxnSpPr>
+          <p:cNvPr id="40" name="Straight Arrow Connector 39">
+            <a:extLst>
+              <a:ext uri="{FF2B5EF4-FFF2-40B4-BE49-F238E27FC236}">
+                <a16:creationId xmlns:a16="http://schemas.microsoft.com/office/drawing/2014/main" id="{B5FF0131-4C63-4AA9-80F9-0E8F5A86A986}"/>
+              </a:ext>
+            </a:extLst>
+          </p:cNvPr>
+          <p:cNvCxnSpPr>
+            <a:cxnSpLocks/>
+            <a:stCxn id="4" idx="3"/>
+            <a:endCxn id="34" idx="1"/>
+          </p:cNvCxnSpPr>
+          <p:nvPr/>
+        </p:nvCxnSpPr>
+        <p:spPr>
+          <a:xfrm>
+            <a:off x="9070253" y="4526280"/>
+            <a:ext cx="493215" cy="0"/>
+          </a:xfrm>
+          <a:prstGeom prst="straightConnector1">
+            <a:avLst/>
+          </a:prstGeom>
+          <a:ln w="19050">
+            <a:solidFill>
+              <a:schemeClr val="bg1"/>
+            </a:solidFill>
+            <a:tailEnd type="triangle"/>
+          </a:ln>
+        </p:spPr>
+        <p:style>
+          <a:lnRef idx="1">
+            <a:schemeClr val="accent1"/>
+          </a:lnRef>
+          <a:fillRef idx="0">
+            <a:schemeClr val="accent1"/>
+          </a:fillRef>
+          <a:effectRef idx="0">
+            <a:schemeClr val="accent1"/>
+          </a:effectRef>
+          <a:fontRef idx="minor">
+            <a:schemeClr val="tx1"/>
+          </a:fontRef>
+        </p:style>
+      </p:cxnSp>
+      <p:sp>
+        <p:nvSpPr>
+          <p:cNvPr id="42" name="Rectangle 41">
+            <a:extLst>
+              <a:ext uri="{FF2B5EF4-FFF2-40B4-BE49-F238E27FC236}">
+                <a16:creationId xmlns:a16="http://schemas.microsoft.com/office/drawing/2014/main" id="{63E1ADC8-096C-4DC9-B980-005DDFC9F13A}"/>
+              </a:ext>
+            </a:extLst>
+          </p:cNvPr>
+          <p:cNvSpPr/>
+          <p:nvPr/>
+        </p:nvSpPr>
+        <p:spPr>
+          <a:xfrm>
+            <a:off x="7393808" y="1546028"/>
+            <a:ext cx="1669517" cy="896702"/>
+          </a:xfrm>
+          <a:prstGeom prst="rect">
+            <a:avLst/>
+          </a:prstGeom>
+        </p:spPr>
+        <p:style>
+          <a:lnRef idx="2">
+            <a:schemeClr val="accent6">
+              <a:shade val="50000"/>
+            </a:schemeClr>
+          </a:lnRef>
+          <a:fillRef idx="1">
+            <a:schemeClr val="accent6"/>
+          </a:fillRef>
+          <a:effectRef idx="0">
+            <a:schemeClr val="accent6"/>
+          </a:effectRef>
+          <a:fontRef idx="minor">
+            <a:schemeClr val="lt1"/>
+          </a:fontRef>
+        </p:style>
+        <p:txBody>
+          <a:bodyPr rtlCol="0" anchor="ctr"/>
+          <a:lstStyle/>
+          <a:p>
+            <a:pPr algn="ctr"/>
+            <a:r>
+              <a:rPr lang="en-US" dirty="0"/>
+              <a:t>User Input </a:t>
+            </a:r>
+            <a:r>
+              <a:rPr lang="en-US" b="1" dirty="0">
+                <a:solidFill>
+                  <a:srgbClr val="FFFF00"/>
+                </a:solidFill>
+              </a:rPr>
+              <a:t>Name, Email</a:t>
+            </a:r>
+          </a:p>
+        </p:txBody>
+      </p:sp>
+      <p:cxnSp>
+        <p:nvCxnSpPr>
+          <p:cNvPr id="44" name="Straight Arrow Connector 43">
+            <a:extLst>
+              <a:ext uri="{FF2B5EF4-FFF2-40B4-BE49-F238E27FC236}">
+                <a16:creationId xmlns:a16="http://schemas.microsoft.com/office/drawing/2014/main" id="{CCBA69A3-1EB7-44A8-B932-2103ECA56D7D}"/>
+              </a:ext>
+            </a:extLst>
+          </p:cNvPr>
+          <p:cNvCxnSpPr>
+            <a:cxnSpLocks/>
+          </p:cNvCxnSpPr>
+          <p:nvPr/>
+        </p:nvCxnSpPr>
+        <p:spPr>
+          <a:xfrm>
+            <a:off x="8228567" y="2442730"/>
+            <a:ext cx="0" cy="1635199"/>
+          </a:xfrm>
+          <a:prstGeom prst="straightConnector1">
+            <a:avLst/>
+          </a:prstGeom>
+          <a:ln w="19050">
+            <a:solidFill>
+              <a:schemeClr val="bg1"/>
+            </a:solidFill>
+            <a:tailEnd type="triangle"/>
+          </a:ln>
+        </p:spPr>
+        <p:style>
+          <a:lnRef idx="1">
+            <a:schemeClr val="accent1"/>
+          </a:lnRef>
+          <a:fillRef idx="0">
+            <a:schemeClr val="accent1"/>
+          </a:fillRef>
+          <a:effectRef idx="0">
+            <a:schemeClr val="accent1"/>
+          </a:effectRef>
+          <a:fontRef idx="minor">
+            <a:schemeClr val="tx1"/>
+          </a:fontRef>
+        </p:style>
+      </p:cxnSp>
+      <p:sp>
+        <p:nvSpPr>
+          <p:cNvPr id="48" name="Rectangle 47">
+            <a:extLst>
+              <a:ext uri="{FF2B5EF4-FFF2-40B4-BE49-F238E27FC236}">
+                <a16:creationId xmlns:a16="http://schemas.microsoft.com/office/drawing/2014/main" id="{16BC67CE-29A4-47ED-929A-03002FF8D381}"/>
+              </a:ext>
+            </a:extLst>
+          </p:cNvPr>
+          <p:cNvSpPr/>
+          <p:nvPr/>
+        </p:nvSpPr>
+        <p:spPr>
+          <a:xfrm>
+            <a:off x="9563468" y="1546028"/>
+            <a:ext cx="1669517" cy="896702"/>
+          </a:xfrm>
+          <a:prstGeom prst="rect">
+            <a:avLst/>
+          </a:prstGeom>
+        </p:spPr>
+        <p:style>
+          <a:lnRef idx="2">
+            <a:schemeClr val="accent6">
+              <a:shade val="50000"/>
+            </a:schemeClr>
+          </a:lnRef>
+          <a:fillRef idx="1">
+            <a:schemeClr val="accent6"/>
+          </a:fillRef>
+          <a:effectRef idx="0">
+            <a:schemeClr val="accent6"/>
+          </a:effectRef>
+          <a:fontRef idx="minor">
+            <a:schemeClr val="lt1"/>
+          </a:fontRef>
+        </p:style>
+        <p:txBody>
+          <a:bodyPr rtlCol="0" anchor="ctr"/>
+          <a:lstStyle/>
+          <a:p>
+            <a:pPr algn="ctr"/>
+            <a:r>
+              <a:rPr lang="en-US" dirty="0"/>
+              <a:t>User Input </a:t>
+            </a:r>
+            <a:r>
+              <a:rPr lang="en-US" b="1" dirty="0">
+                <a:solidFill>
+                  <a:srgbClr val="FFFF00"/>
+                </a:solidFill>
+              </a:rPr>
+              <a:t>Download Button</a:t>
+            </a:r>
+          </a:p>
+        </p:txBody>
+      </p:sp>
+      <p:cxnSp>
+        <p:nvCxnSpPr>
+          <p:cNvPr id="49" name="Straight Arrow Connector 48">
+            <a:extLst>
+              <a:ext uri="{FF2B5EF4-FFF2-40B4-BE49-F238E27FC236}">
+                <a16:creationId xmlns:a16="http://schemas.microsoft.com/office/drawing/2014/main" id="{BEDC709A-E3BE-4D50-ACC6-1A337DDF55A6}"/>
+              </a:ext>
+            </a:extLst>
+          </p:cNvPr>
+          <p:cNvCxnSpPr>
+            <a:cxnSpLocks/>
+          </p:cNvCxnSpPr>
+          <p:nvPr/>
+        </p:nvCxnSpPr>
+        <p:spPr>
+          <a:xfrm>
+            <a:off x="10398227" y="2442730"/>
+            <a:ext cx="0" cy="1635199"/>
+          </a:xfrm>
+          <a:prstGeom prst="straightConnector1">
+            <a:avLst/>
+          </a:prstGeom>
+          <a:ln w="19050">
+            <a:solidFill>
+              <a:schemeClr val="bg1"/>
+            </a:solidFill>
+            <a:tailEnd type="triangle"/>
+          </a:ln>
+        </p:spPr>
+        <p:style>
+          <a:lnRef idx="1">
+            <a:schemeClr val="accent1"/>
+          </a:lnRef>
+          <a:fillRef idx="0">
+            <a:schemeClr val="accent1"/>
+          </a:fillRef>
+          <a:effectRef idx="0">
+            <a:schemeClr val="accent1"/>
+          </a:effectRef>
+          <a:fontRef idx="minor">
+            <a:schemeClr val="tx1"/>
+          </a:fontRef>
+        </p:style>
+      </p:cxnSp>
+      <p:cxnSp>
+        <p:nvCxnSpPr>
+          <p:cNvPr id="50" name="Straight Arrow Connector 49">
+            <a:extLst>
+              <a:ext uri="{FF2B5EF4-FFF2-40B4-BE49-F238E27FC236}">
+                <a16:creationId xmlns:a16="http://schemas.microsoft.com/office/drawing/2014/main" id="{F3608ECD-721E-4272-881A-86D3C647539D}"/>
+              </a:ext>
+            </a:extLst>
+          </p:cNvPr>
+          <p:cNvCxnSpPr>
+            <a:cxnSpLocks/>
+          </p:cNvCxnSpPr>
+          <p:nvPr/>
+        </p:nvCxnSpPr>
+        <p:spPr>
+          <a:xfrm>
+            <a:off x="5418918" y="6468798"/>
+            <a:ext cx="329378" cy="0"/>
+          </a:xfrm>
+          <a:prstGeom prst="straightConnector1">
+            <a:avLst/>
+          </a:prstGeom>
+          <a:ln w="19050">
+            <a:solidFill>
+              <a:schemeClr val="bg1"/>
+            </a:solidFill>
+            <a:tailEnd type="triangle"/>
+          </a:ln>
+        </p:spPr>
+        <p:style>
+          <a:lnRef idx="1">
+            <a:schemeClr val="accent1"/>
+          </a:lnRef>
+          <a:fillRef idx="0">
+            <a:schemeClr val="accent1"/>
+          </a:fillRef>
+          <a:effectRef idx="0">
+            <a:schemeClr val="accent1"/>
+          </a:effectRef>
+          <a:fontRef idx="minor">
+            <a:schemeClr val="tx1"/>
+          </a:fontRef>
+        </p:style>
+      </p:cxnSp>
+      <p:sp>
+        <p:nvSpPr>
+          <p:cNvPr id="51" name="TextBox 50">
+            <a:extLst>
+              <a:ext uri="{FF2B5EF4-FFF2-40B4-BE49-F238E27FC236}">
+                <a16:creationId xmlns:a16="http://schemas.microsoft.com/office/drawing/2014/main" id="{40B7CD24-E999-40D6-8519-BBAA232E02E4}"/>
+              </a:ext>
+            </a:extLst>
+          </p:cNvPr>
+          <p:cNvSpPr txBox="1"/>
+          <p:nvPr/>
+        </p:nvSpPr>
+        <p:spPr>
+          <a:xfrm>
+            <a:off x="5748296" y="6289181"/>
+            <a:ext cx="1644040" cy="369332"/>
+          </a:xfrm>
+          <a:prstGeom prst="rect">
+            <a:avLst/>
+          </a:prstGeom>
+          <a:noFill/>
+        </p:spPr>
+        <p:txBody>
+          <a:bodyPr wrap="none" rtlCol="0">
+            <a:spAutoFit/>
+          </a:bodyPr>
+          <a:lstStyle/>
+          <a:p>
+            <a:r>
+              <a:rPr lang="en-US" dirty="0">
+                <a:solidFill>
+                  <a:schemeClr val="bg1"/>
+                </a:solidFill>
+              </a:rPr>
+              <a:t>Misc. Metadata</a:t>
+            </a:r>
+          </a:p>
+        </p:txBody>
+      </p:sp>
     </p:spTree>
     <p:extLst>
       <p:ext uri="{BB962C8B-B14F-4D97-AF65-F5344CB8AC3E}">

</xml_diff>